<commit_message>
Dedicated Telemetry Interface (DTI)
Added the new "FRAME" software module to implement the DTI using SERCOM0 configured for SPI Slave mode.  The received data frame (maximum payload of 1KB) is buffered and then parsed into the global data structure APP_rxDataFrame which contains 4 fields (command, index, payload length, and pointer to the beginning of the payload array).
</commit_message>
<xml_diff>
--- a/AO-Smith-MSFT-MCHP-r6.pptx
+++ b/AO-Smith-MSFT-MCHP-r6.pptx
@@ -510,7 +510,7 @@
           <a:p>
             <a:fld id="{98615C2D-FB91-8740-95C2-23C11A10F2F2}" type="datetimeFigureOut">
               <a:rPr lang="en-US" smtClean="0"/>
-              <a:t>10/29/21</a:t>
+              <a:t>10/31/21</a:t>
             </a:fld>
             <a:endParaRPr lang="en-US"/>
           </a:p>
@@ -688,7 +688,7 @@
           <a:p>
             <a:fld id="{F154E49F-5C3A-ED4E-A68A-CCB3AA3B5D59}" type="datetimeFigureOut">
               <a:rPr lang="en-US" smtClean="0"/>
-              <a:t>10/29/21</a:t>
+              <a:t>10/31/21</a:t>
             </a:fld>
             <a:endParaRPr lang="en-US"/>
           </a:p>
@@ -17888,6 +17888,560 @@
           </a:p>
         </p:txBody>
       </p:sp>
+      <p:grpSp>
+        <p:nvGrpSpPr>
+          <p:cNvPr id="6" name="Group 5">
+            <a:extLst>
+              <a:ext uri="{FF2B5EF4-FFF2-40B4-BE49-F238E27FC236}">
+                <a16:creationId xmlns:a16="http://schemas.microsoft.com/office/drawing/2014/main" id="{86383954-CA34-CA4A-ADAE-6229C7A6A143}"/>
+              </a:ext>
+            </a:extLst>
+          </p:cNvPr>
+          <p:cNvGrpSpPr/>
+          <p:nvPr/>
+        </p:nvGrpSpPr>
+        <p:grpSpPr>
+          <a:xfrm>
+            <a:off x="3793543" y="2491092"/>
+            <a:ext cx="2464466" cy="527229"/>
+            <a:chOff x="3793543" y="2491092"/>
+            <a:chExt cx="2464466" cy="527229"/>
+          </a:xfrm>
+        </p:grpSpPr>
+        <p:cxnSp>
+          <p:nvCxnSpPr>
+            <p:cNvPr id="4" name="Straight Arrow Connector 3">
+              <a:extLst>
+                <a:ext uri="{FF2B5EF4-FFF2-40B4-BE49-F238E27FC236}">
+                  <a16:creationId xmlns:a16="http://schemas.microsoft.com/office/drawing/2014/main" id="{5252D2C5-A586-A04E-ACC4-E62CD3184AF5}"/>
+                </a:ext>
+              </a:extLst>
+            </p:cNvPr>
+            <p:cNvCxnSpPr/>
+            <p:nvPr/>
+          </p:nvCxnSpPr>
+          <p:spPr>
+            <a:xfrm flipH="1">
+              <a:off x="4134823" y="2635585"/>
+              <a:ext cx="735724" cy="0"/>
+            </a:xfrm>
+            <a:prstGeom prst="straightConnector1">
+              <a:avLst/>
+            </a:prstGeom>
+            <a:ln w="38100">
+              <a:solidFill>
+                <a:srgbClr val="00B0F0"/>
+              </a:solidFill>
+              <a:headEnd type="none" w="lg" len="med"/>
+              <a:tailEnd type="arrow"/>
+            </a:ln>
+            <a:effectLst/>
+          </p:spPr>
+          <p:style>
+            <a:lnRef idx="2">
+              <a:schemeClr val="accent1"/>
+            </a:lnRef>
+            <a:fillRef idx="0">
+              <a:schemeClr val="accent1"/>
+            </a:fillRef>
+            <a:effectRef idx="1">
+              <a:schemeClr val="accent1"/>
+            </a:effectRef>
+            <a:fontRef idx="minor">
+              <a:schemeClr val="tx1"/>
+            </a:fontRef>
+          </p:style>
+        </p:cxnSp>
+        <p:sp>
+          <p:nvSpPr>
+            <p:cNvPr id="24" name="Oval 23">
+              <a:extLst>
+                <a:ext uri="{FF2B5EF4-FFF2-40B4-BE49-F238E27FC236}">
+                  <a16:creationId xmlns:a16="http://schemas.microsoft.com/office/drawing/2014/main" id="{A274C0DC-25BF-1B45-B531-F099DA16727B}"/>
+                </a:ext>
+              </a:extLst>
+            </p:cNvPr>
+            <p:cNvSpPr/>
+            <p:nvPr/>
+          </p:nvSpPr>
+          <p:spPr>
+            <a:xfrm>
+              <a:off x="3793543" y="2497734"/>
+              <a:ext cx="330401" cy="317116"/>
+            </a:xfrm>
+            <a:prstGeom prst="ellipse">
+              <a:avLst/>
+            </a:prstGeom>
+            <a:noFill/>
+            <a:ln w="25400">
+              <a:solidFill>
+                <a:srgbClr val="00B0F0"/>
+              </a:solidFill>
+            </a:ln>
+            <a:effectLst/>
+          </p:spPr>
+          <p:style>
+            <a:lnRef idx="1">
+              <a:schemeClr val="accent1"/>
+            </a:lnRef>
+            <a:fillRef idx="3">
+              <a:schemeClr val="accent1"/>
+            </a:fillRef>
+            <a:effectRef idx="2">
+              <a:schemeClr val="accent1"/>
+            </a:effectRef>
+            <a:fontRef idx="minor">
+              <a:schemeClr val="lt1"/>
+            </a:fontRef>
+          </p:style>
+          <p:txBody>
+            <a:bodyPr rot="0" spcFirstLastPara="0" vertOverflow="overflow" horzOverflow="overflow" vert="horz" wrap="square" lIns="91440" tIns="45720" rIns="91440" bIns="45720" numCol="1" spcCol="0" rtlCol="0" fromWordArt="0" anchor="ctr" anchorCtr="0" forceAA="0" compatLnSpc="1">
+              <a:prstTxWarp prst="textNoShape">
+                <a:avLst/>
+              </a:prstTxWarp>
+              <a:noAutofit/>
+            </a:bodyPr>
+            <a:lstStyle/>
+            <a:p>
+              <a:pPr algn="ctr"/>
+              <a:endParaRPr lang="en-US"/>
+            </a:p>
+          </p:txBody>
+        </p:sp>
+        <p:sp>
+          <p:nvSpPr>
+            <p:cNvPr id="5" name="Rectangle 4">
+              <a:extLst>
+                <a:ext uri="{FF2B5EF4-FFF2-40B4-BE49-F238E27FC236}">
+                  <a16:creationId xmlns:a16="http://schemas.microsoft.com/office/drawing/2014/main" id="{04BADD81-AD1B-4D41-B299-2F044EA1EFD5}"/>
+                </a:ext>
+              </a:extLst>
+            </p:cNvPr>
+            <p:cNvSpPr/>
+            <p:nvPr/>
+          </p:nvSpPr>
+          <p:spPr>
+            <a:xfrm>
+              <a:off x="4770268" y="2491092"/>
+              <a:ext cx="1487741" cy="527229"/>
+            </a:xfrm>
+            <a:prstGeom prst="rect">
+              <a:avLst/>
+            </a:prstGeom>
+            <a:noFill/>
+            <a:ln>
+              <a:noFill/>
+            </a:ln>
+            <a:effectLst/>
+          </p:spPr>
+          <p:style>
+            <a:lnRef idx="1">
+              <a:schemeClr val="accent1"/>
+            </a:lnRef>
+            <a:fillRef idx="3">
+              <a:schemeClr val="accent1"/>
+            </a:fillRef>
+            <a:effectRef idx="2">
+              <a:schemeClr val="accent1"/>
+            </a:effectRef>
+            <a:fontRef idx="minor">
+              <a:schemeClr val="lt1"/>
+            </a:fontRef>
+          </p:style>
+          <p:txBody>
+            <a:bodyPr rot="0" spcFirstLastPara="0" vertOverflow="overflow" horzOverflow="overflow" vert="horz" wrap="square" lIns="91440" tIns="45720" rIns="91440" bIns="45720" numCol="1" spcCol="0" rtlCol="0" fromWordArt="0" anchor="ctr" anchorCtr="0" forceAA="0" compatLnSpc="1">
+              <a:prstTxWarp prst="textNoShape">
+                <a:avLst/>
+              </a:prstTxWarp>
+              <a:noAutofit/>
+            </a:bodyPr>
+            <a:lstStyle/>
+            <a:p>
+              <a:pPr algn="ctr"/>
+              <a:r>
+                <a:rPr lang="en-US" sz="1800" dirty="0">
+                  <a:solidFill>
+                    <a:schemeClr val="tx1"/>
+                  </a:solidFill>
+                  <a:latin typeface="Arial" panose="020B0604020202020204" pitchFamily="34" charset="0"/>
+                  <a:cs typeface="Arial" panose="020B0604020202020204" pitchFamily="34" charset="0"/>
+                </a:rPr>
+                <a:t>1. Press the SW0 Button</a:t>
+              </a:r>
+            </a:p>
+          </p:txBody>
+        </p:sp>
+      </p:grpSp>
+      <p:grpSp>
+        <p:nvGrpSpPr>
+          <p:cNvPr id="8" name="Group 7">
+            <a:extLst>
+              <a:ext uri="{FF2B5EF4-FFF2-40B4-BE49-F238E27FC236}">
+                <a16:creationId xmlns:a16="http://schemas.microsoft.com/office/drawing/2014/main" id="{DA304DFE-ED12-7D48-8EF5-9A738AD7B4B6}"/>
+              </a:ext>
+            </a:extLst>
+          </p:cNvPr>
+          <p:cNvGrpSpPr/>
+          <p:nvPr/>
+        </p:nvGrpSpPr>
+        <p:grpSpPr>
+          <a:xfrm>
+            <a:off x="3910402" y="1662194"/>
+            <a:ext cx="2284640" cy="527229"/>
+            <a:chOff x="3910402" y="1662194"/>
+            <a:chExt cx="2284640" cy="527229"/>
+          </a:xfrm>
+        </p:grpSpPr>
+        <p:sp>
+          <p:nvSpPr>
+            <p:cNvPr id="25" name="Oval 24">
+              <a:extLst>
+                <a:ext uri="{FF2B5EF4-FFF2-40B4-BE49-F238E27FC236}">
+                  <a16:creationId xmlns:a16="http://schemas.microsoft.com/office/drawing/2014/main" id="{B4FF2B61-3E96-044E-9429-DEC0A00573B6}"/>
+                </a:ext>
+              </a:extLst>
+            </p:cNvPr>
+            <p:cNvSpPr/>
+            <p:nvPr/>
+          </p:nvSpPr>
+          <p:spPr>
+            <a:xfrm>
+              <a:off x="3910402" y="1689865"/>
+              <a:ext cx="182012" cy="194689"/>
+            </a:xfrm>
+            <a:prstGeom prst="ellipse">
+              <a:avLst/>
+            </a:prstGeom>
+            <a:noFill/>
+            <a:ln w="25400">
+              <a:solidFill>
+                <a:srgbClr val="00B0F0"/>
+              </a:solidFill>
+            </a:ln>
+            <a:effectLst/>
+          </p:spPr>
+          <p:style>
+            <a:lnRef idx="1">
+              <a:schemeClr val="accent1"/>
+            </a:lnRef>
+            <a:fillRef idx="3">
+              <a:schemeClr val="accent1"/>
+            </a:fillRef>
+            <a:effectRef idx="2">
+              <a:schemeClr val="accent1"/>
+            </a:effectRef>
+            <a:fontRef idx="minor">
+              <a:schemeClr val="lt1"/>
+            </a:fontRef>
+          </p:style>
+          <p:txBody>
+            <a:bodyPr rot="0" spcFirstLastPara="0" vertOverflow="overflow" horzOverflow="overflow" vert="horz" wrap="square" lIns="91440" tIns="45720" rIns="91440" bIns="45720" numCol="1" spcCol="0" rtlCol="0" fromWordArt="0" anchor="ctr" anchorCtr="0" forceAA="0" compatLnSpc="1">
+              <a:prstTxWarp prst="textNoShape">
+                <a:avLst/>
+              </a:prstTxWarp>
+              <a:noAutofit/>
+            </a:bodyPr>
+            <a:lstStyle/>
+            <a:p>
+              <a:pPr algn="ctr"/>
+              <a:endParaRPr lang="en-US"/>
+            </a:p>
+          </p:txBody>
+        </p:sp>
+        <p:cxnSp>
+          <p:nvCxnSpPr>
+            <p:cNvPr id="27" name="Straight Arrow Connector 26">
+              <a:extLst>
+                <a:ext uri="{FF2B5EF4-FFF2-40B4-BE49-F238E27FC236}">
+                  <a16:creationId xmlns:a16="http://schemas.microsoft.com/office/drawing/2014/main" id="{DB4A0FDE-74C6-CD47-A779-3BDD29CD3FBD}"/>
+                </a:ext>
+              </a:extLst>
+            </p:cNvPr>
+            <p:cNvCxnSpPr/>
+            <p:nvPr/>
+          </p:nvCxnSpPr>
+          <p:spPr>
+            <a:xfrm flipH="1">
+              <a:off x="4092414" y="1787209"/>
+              <a:ext cx="735724" cy="0"/>
+            </a:xfrm>
+            <a:prstGeom prst="straightConnector1">
+              <a:avLst/>
+            </a:prstGeom>
+            <a:ln w="38100">
+              <a:solidFill>
+                <a:srgbClr val="00B0F0"/>
+              </a:solidFill>
+              <a:headEnd type="none" w="lg" len="med"/>
+              <a:tailEnd type="arrow"/>
+            </a:ln>
+            <a:effectLst/>
+          </p:spPr>
+          <p:style>
+            <a:lnRef idx="2">
+              <a:schemeClr val="accent1"/>
+            </a:lnRef>
+            <a:fillRef idx="0">
+              <a:schemeClr val="accent1"/>
+            </a:fillRef>
+            <a:effectRef idx="1">
+              <a:schemeClr val="accent1"/>
+            </a:effectRef>
+            <a:fontRef idx="minor">
+              <a:schemeClr val="tx1"/>
+            </a:fontRef>
+          </p:style>
+        </p:cxnSp>
+        <p:sp>
+          <p:nvSpPr>
+            <p:cNvPr id="30" name="Rectangle 29">
+              <a:extLst>
+                <a:ext uri="{FF2B5EF4-FFF2-40B4-BE49-F238E27FC236}">
+                  <a16:creationId xmlns:a16="http://schemas.microsoft.com/office/drawing/2014/main" id="{AC7A6D54-A5DB-E04B-89B5-643AD722C591}"/>
+                </a:ext>
+              </a:extLst>
+            </p:cNvPr>
+            <p:cNvSpPr/>
+            <p:nvPr/>
+          </p:nvSpPr>
+          <p:spPr>
+            <a:xfrm>
+              <a:off x="4707301" y="1662194"/>
+              <a:ext cx="1487741" cy="527229"/>
+            </a:xfrm>
+            <a:prstGeom prst="rect">
+              <a:avLst/>
+            </a:prstGeom>
+            <a:noFill/>
+            <a:ln>
+              <a:noFill/>
+            </a:ln>
+            <a:effectLst/>
+          </p:spPr>
+          <p:style>
+            <a:lnRef idx="1">
+              <a:schemeClr val="accent1"/>
+            </a:lnRef>
+            <a:fillRef idx="3">
+              <a:schemeClr val="accent1"/>
+            </a:fillRef>
+            <a:effectRef idx="2">
+              <a:schemeClr val="accent1"/>
+            </a:effectRef>
+            <a:fontRef idx="minor">
+              <a:schemeClr val="lt1"/>
+            </a:fontRef>
+          </p:style>
+          <p:txBody>
+            <a:bodyPr rot="0" spcFirstLastPara="0" vertOverflow="overflow" horzOverflow="overflow" vert="horz" wrap="square" lIns="91440" tIns="45720" rIns="91440" bIns="45720" numCol="1" spcCol="0" rtlCol="0" fromWordArt="0" anchor="ctr" anchorCtr="0" forceAA="0" compatLnSpc="1">
+              <a:prstTxWarp prst="textNoShape">
+                <a:avLst/>
+              </a:prstTxWarp>
+              <a:noAutofit/>
+            </a:bodyPr>
+            <a:lstStyle/>
+            <a:p>
+              <a:pPr algn="ctr"/>
+              <a:r>
+                <a:rPr lang="en-US" sz="1800" dirty="0">
+                  <a:solidFill>
+                    <a:schemeClr val="tx1"/>
+                  </a:solidFill>
+                  <a:latin typeface="Arial" panose="020B0604020202020204" pitchFamily="34" charset="0"/>
+                  <a:cs typeface="Arial" panose="020B0604020202020204" pitchFamily="34" charset="0"/>
+                </a:rPr>
+                <a:t>2. Red LED Toggles</a:t>
+              </a:r>
+            </a:p>
+          </p:txBody>
+        </p:sp>
+      </p:grpSp>
+      <p:grpSp>
+        <p:nvGrpSpPr>
+          <p:cNvPr id="10" name="Group 9">
+            <a:extLst>
+              <a:ext uri="{FF2B5EF4-FFF2-40B4-BE49-F238E27FC236}">
+                <a16:creationId xmlns:a16="http://schemas.microsoft.com/office/drawing/2014/main" id="{636B80DF-A247-5C46-886C-C646D62A1BF8}"/>
+              </a:ext>
+            </a:extLst>
+          </p:cNvPr>
+          <p:cNvGrpSpPr/>
+          <p:nvPr/>
+        </p:nvGrpSpPr>
+        <p:grpSpPr>
+          <a:xfrm>
+            <a:off x="10707651" y="530508"/>
+            <a:ext cx="1427753" cy="1487741"/>
+            <a:chOff x="10707651" y="530508"/>
+            <a:chExt cx="1427753" cy="1487741"/>
+          </a:xfrm>
+        </p:grpSpPr>
+        <p:sp>
+          <p:nvSpPr>
+            <p:cNvPr id="26" name="Oval 25">
+              <a:extLst>
+                <a:ext uri="{FF2B5EF4-FFF2-40B4-BE49-F238E27FC236}">
+                  <a16:creationId xmlns:a16="http://schemas.microsoft.com/office/drawing/2014/main" id="{BC34A803-BC36-2845-98E9-E4B643ABFFE1}"/>
+                </a:ext>
+              </a:extLst>
+            </p:cNvPr>
+            <p:cNvSpPr/>
+            <p:nvPr/>
+          </p:nvSpPr>
+          <p:spPr>
+            <a:xfrm>
+              <a:off x="10707651" y="1689865"/>
+              <a:ext cx="182012" cy="194689"/>
+            </a:xfrm>
+            <a:prstGeom prst="ellipse">
+              <a:avLst/>
+            </a:prstGeom>
+            <a:noFill/>
+            <a:ln w="25400">
+              <a:solidFill>
+                <a:srgbClr val="00B0F0"/>
+              </a:solidFill>
+            </a:ln>
+            <a:effectLst/>
+          </p:spPr>
+          <p:style>
+            <a:lnRef idx="1">
+              <a:schemeClr val="accent1"/>
+            </a:lnRef>
+            <a:fillRef idx="3">
+              <a:schemeClr val="accent1"/>
+            </a:fillRef>
+            <a:effectRef idx="2">
+              <a:schemeClr val="accent1"/>
+            </a:effectRef>
+            <a:fontRef idx="minor">
+              <a:schemeClr val="lt1"/>
+            </a:fontRef>
+          </p:style>
+          <p:txBody>
+            <a:bodyPr rot="0" spcFirstLastPara="0" vertOverflow="overflow" horzOverflow="overflow" vert="horz" wrap="square" lIns="91440" tIns="45720" rIns="91440" bIns="45720" numCol="1" spcCol="0" rtlCol="0" fromWordArt="0" anchor="ctr" anchorCtr="0" forceAA="0" compatLnSpc="1">
+              <a:prstTxWarp prst="textNoShape">
+                <a:avLst/>
+              </a:prstTxWarp>
+              <a:noAutofit/>
+            </a:bodyPr>
+            <a:lstStyle/>
+            <a:p>
+              <a:pPr algn="ctr"/>
+              <a:endParaRPr lang="en-US"/>
+            </a:p>
+          </p:txBody>
+        </p:sp>
+        <p:cxnSp>
+          <p:nvCxnSpPr>
+            <p:cNvPr id="31" name="Straight Arrow Connector 30">
+              <a:extLst>
+                <a:ext uri="{FF2B5EF4-FFF2-40B4-BE49-F238E27FC236}">
+                  <a16:creationId xmlns:a16="http://schemas.microsoft.com/office/drawing/2014/main" id="{1FA0A764-6134-B947-953B-EEBCB4297E31}"/>
+                </a:ext>
+              </a:extLst>
+            </p:cNvPr>
+            <p:cNvCxnSpPr>
+              <a:cxnSpLocks/>
+            </p:cNvCxnSpPr>
+            <p:nvPr/>
+          </p:nvCxnSpPr>
+          <p:spPr>
+            <a:xfrm flipH="1">
+              <a:off x="10889663" y="1787209"/>
+              <a:ext cx="708002" cy="0"/>
+            </a:xfrm>
+            <a:prstGeom prst="straightConnector1">
+              <a:avLst/>
+            </a:prstGeom>
+            <a:ln w="38100">
+              <a:solidFill>
+                <a:srgbClr val="00B0F0"/>
+              </a:solidFill>
+              <a:headEnd type="none" w="lg" len="med"/>
+              <a:tailEnd type="arrow"/>
+            </a:ln>
+            <a:effectLst/>
+          </p:spPr>
+          <p:style>
+            <a:lnRef idx="2">
+              <a:schemeClr val="accent1"/>
+            </a:lnRef>
+            <a:fillRef idx="0">
+              <a:schemeClr val="accent1"/>
+            </a:fillRef>
+            <a:effectRef idx="1">
+              <a:schemeClr val="accent1"/>
+            </a:effectRef>
+            <a:fontRef idx="minor">
+              <a:schemeClr val="tx1"/>
+            </a:fontRef>
+          </p:style>
+        </p:cxnSp>
+        <p:sp>
+          <p:nvSpPr>
+            <p:cNvPr id="32" name="Rectangle 31">
+              <a:extLst>
+                <a:ext uri="{FF2B5EF4-FFF2-40B4-BE49-F238E27FC236}">
+                  <a16:creationId xmlns:a16="http://schemas.microsoft.com/office/drawing/2014/main" id="{705EEFCC-D80D-EB4A-9F04-E711408584E5}"/>
+                </a:ext>
+              </a:extLst>
+            </p:cNvPr>
+            <p:cNvSpPr/>
+            <p:nvPr/>
+          </p:nvSpPr>
+          <p:spPr>
+            <a:xfrm rot="16200000">
+              <a:off x="11127919" y="1010764"/>
+              <a:ext cx="1487741" cy="527229"/>
+            </a:xfrm>
+            <a:prstGeom prst="rect">
+              <a:avLst/>
+            </a:prstGeom>
+            <a:noFill/>
+            <a:ln>
+              <a:noFill/>
+            </a:ln>
+            <a:effectLst/>
+          </p:spPr>
+          <p:style>
+            <a:lnRef idx="1">
+              <a:schemeClr val="accent1"/>
+            </a:lnRef>
+            <a:fillRef idx="3">
+              <a:schemeClr val="accent1"/>
+            </a:fillRef>
+            <a:effectRef idx="2">
+              <a:schemeClr val="accent1"/>
+            </a:effectRef>
+            <a:fontRef idx="minor">
+              <a:schemeClr val="lt1"/>
+            </a:fontRef>
+          </p:style>
+          <p:txBody>
+            <a:bodyPr rot="0" spcFirstLastPara="0" vertOverflow="overflow" horzOverflow="overflow" vert="horz" wrap="square" lIns="91440" tIns="45720" rIns="91440" bIns="45720" numCol="1" spcCol="0" rtlCol="0" fromWordArt="0" anchor="ctr" anchorCtr="0" forceAA="0" compatLnSpc="1">
+              <a:prstTxWarp prst="textNoShape">
+                <a:avLst/>
+              </a:prstTxWarp>
+              <a:noAutofit/>
+            </a:bodyPr>
+            <a:lstStyle/>
+            <a:p>
+              <a:pPr algn="ctr"/>
+              <a:r>
+                <a:rPr lang="en-US" sz="1800" dirty="0">
+                  <a:solidFill>
+                    <a:schemeClr val="tx1"/>
+                  </a:solidFill>
+                  <a:latin typeface="Arial" panose="020B0604020202020204" pitchFamily="34" charset="0"/>
+                  <a:cs typeface="Arial" panose="020B0604020202020204" pitchFamily="34" charset="0"/>
+                </a:rPr>
+                <a:t>3. Red LED Toggles</a:t>
+              </a:r>
+            </a:p>
+          </p:txBody>
+        </p:sp>
+      </p:grpSp>
     </p:spTree>
     <p:extLst>
       <p:ext uri="{BB962C8B-B14F-4D97-AF65-F5344CB8AC3E}">
@@ -17898,6 +18452,171 @@
   <p:clrMapOvr>
     <a:masterClrMapping/>
   </p:clrMapOvr>
+  <p:timing>
+    <p:tnLst>
+      <p:par>
+        <p:cTn id="1" dur="indefinite" restart="never" nodeType="tmRoot">
+          <p:childTnLst>
+            <p:seq concurrent="1" nextAc="seek">
+              <p:cTn id="2" dur="indefinite" nodeType="mainSeq">
+                <p:childTnLst>
+                  <p:par>
+                    <p:cTn id="3" fill="hold">
+                      <p:stCondLst>
+                        <p:cond delay="indefinite"/>
+                      </p:stCondLst>
+                      <p:childTnLst>
+                        <p:par>
+                          <p:cTn id="4" fill="hold">
+                            <p:stCondLst>
+                              <p:cond delay="0"/>
+                            </p:stCondLst>
+                            <p:childTnLst>
+                              <p:par>
+                                <p:cTn id="5" presetID="1" presetClass="entr" presetSubtype="0" fill="hold" nodeType="clickEffect">
+                                  <p:stCondLst>
+                                    <p:cond delay="0"/>
+                                  </p:stCondLst>
+                                  <p:childTnLst>
+                                    <p:set>
+                                      <p:cBhvr>
+                                        <p:cTn id="6" dur="1" fill="hold">
+                                          <p:stCondLst>
+                                            <p:cond delay="0"/>
+                                          </p:stCondLst>
+                                        </p:cTn>
+                                        <p:tgtEl>
+                                          <p:spTgt spid="6"/>
+                                        </p:tgtEl>
+                                        <p:attrNameLst>
+                                          <p:attrName>style.visibility</p:attrName>
+                                        </p:attrNameLst>
+                                      </p:cBhvr>
+                                      <p:to>
+                                        <p:strVal val="visible"/>
+                                      </p:to>
+                                    </p:set>
+                                  </p:childTnLst>
+                                </p:cTn>
+                              </p:par>
+                            </p:childTnLst>
+                          </p:cTn>
+                        </p:par>
+                      </p:childTnLst>
+                    </p:cTn>
+                  </p:par>
+                  <p:par>
+                    <p:cTn id="7" fill="hold">
+                      <p:stCondLst>
+                        <p:cond delay="indefinite"/>
+                      </p:stCondLst>
+                      <p:childTnLst>
+                        <p:par>
+                          <p:cTn id="8" fill="hold">
+                            <p:stCondLst>
+                              <p:cond delay="0"/>
+                            </p:stCondLst>
+                            <p:childTnLst>
+                              <p:par>
+                                <p:cTn id="9" presetID="1" presetClass="entr" presetSubtype="0" fill="hold" nodeType="clickEffect">
+                                  <p:stCondLst>
+                                    <p:cond delay="0"/>
+                                  </p:stCondLst>
+                                  <p:childTnLst>
+                                    <p:set>
+                                      <p:cBhvr>
+                                        <p:cTn id="10" dur="1" fill="hold">
+                                          <p:stCondLst>
+                                            <p:cond delay="0"/>
+                                          </p:stCondLst>
+                                        </p:cTn>
+                                        <p:tgtEl>
+                                          <p:spTgt spid="8"/>
+                                        </p:tgtEl>
+                                        <p:attrNameLst>
+                                          <p:attrName>style.visibility</p:attrName>
+                                        </p:attrNameLst>
+                                      </p:cBhvr>
+                                      <p:to>
+                                        <p:strVal val="visible"/>
+                                      </p:to>
+                                    </p:set>
+                                  </p:childTnLst>
+                                </p:cTn>
+                              </p:par>
+                            </p:childTnLst>
+                          </p:cTn>
+                        </p:par>
+                      </p:childTnLst>
+                    </p:cTn>
+                  </p:par>
+                  <p:par>
+                    <p:cTn id="11" fill="hold">
+                      <p:stCondLst>
+                        <p:cond delay="indefinite"/>
+                      </p:stCondLst>
+                      <p:childTnLst>
+                        <p:par>
+                          <p:cTn id="12" fill="hold">
+                            <p:stCondLst>
+                              <p:cond delay="0"/>
+                            </p:stCondLst>
+                            <p:childTnLst>
+                              <p:par>
+                                <p:cTn id="13" presetID="1" presetClass="entr" presetSubtype="0" fill="hold" nodeType="clickEffect">
+                                  <p:stCondLst>
+                                    <p:cond delay="0"/>
+                                  </p:stCondLst>
+                                  <p:childTnLst>
+                                    <p:set>
+                                      <p:cBhvr>
+                                        <p:cTn id="14" dur="1" fill="hold">
+                                          <p:stCondLst>
+                                            <p:cond delay="0"/>
+                                          </p:stCondLst>
+                                        </p:cTn>
+                                        <p:tgtEl>
+                                          <p:spTgt spid="10"/>
+                                        </p:tgtEl>
+                                        <p:attrNameLst>
+                                          <p:attrName>style.visibility</p:attrName>
+                                        </p:attrNameLst>
+                                      </p:cBhvr>
+                                      <p:to>
+                                        <p:strVal val="visible"/>
+                                      </p:to>
+                                    </p:set>
+                                  </p:childTnLst>
+                                </p:cTn>
+                              </p:par>
+                            </p:childTnLst>
+                          </p:cTn>
+                        </p:par>
+                      </p:childTnLst>
+                    </p:cTn>
+                  </p:par>
+                </p:childTnLst>
+              </p:cTn>
+              <p:prevCondLst>
+                <p:cond evt="onPrev" delay="0">
+                  <p:tgtEl>
+                    <p:sldTgt/>
+                  </p:tgtEl>
+                </p:cond>
+              </p:prevCondLst>
+              <p:nextCondLst>
+                <p:cond evt="onNext" delay="0">
+                  <p:tgtEl>
+                    <p:sldTgt/>
+                  </p:tgtEl>
+                </p:cond>
+              </p:nextCondLst>
+            </p:seq>
+          </p:childTnLst>
+        </p:cTn>
+      </p:par>
+    </p:tnLst>
+  </p:timing>
 </p:sld>
 </file>
 

</xml_diff>

<commit_message>
Increase telemetry payload buffer
</commit_message>
<xml_diff>
--- a/AO-Smith-MSFT-MCHP-r6.pptx
+++ b/AO-Smith-MSFT-MCHP-r6.pptx
@@ -510,7 +510,7 @@
           <a:p>
             <a:fld id="{98615C2D-FB91-8740-95C2-23C11A10F2F2}" type="datetimeFigureOut">
               <a:rPr lang="en-US" smtClean="0"/>
-              <a:t>10/31/21</a:t>
+              <a:t>11/1/21</a:t>
             </a:fld>
             <a:endParaRPr lang="en-US"/>
           </a:p>
@@ -688,7 +688,7 @@
           <a:p>
             <a:fld id="{F154E49F-5C3A-ED4E-A68A-CCB3AA3B5D59}" type="datetimeFigureOut">
               <a:rPr lang="en-US" smtClean="0"/>
-              <a:t>10/31/21</a:t>
+              <a:t>11/1/21</a:t>
             </a:fld>
             <a:endParaRPr lang="en-US"/>
           </a:p>
@@ -11779,14 +11779,14 @@
           <p:nvPr>
             <p:extLst>
               <p:ext uri="{D42A27DB-BD31-4B8C-83A1-F6EECF244321}">
-                <p14:modId xmlns:p14="http://schemas.microsoft.com/office/powerpoint/2010/main" val="3066852343"/>
+                <p14:modId xmlns:p14="http://schemas.microsoft.com/office/powerpoint/2010/main" val="1030662919"/>
               </p:ext>
             </p:extLst>
           </p:nvPr>
         </p:nvGraphicFramePr>
         <p:xfrm>
           <a:off x="682521" y="1966389"/>
-          <a:ext cx="11005896" cy="3108960"/>
+          <a:ext cx="11005896" cy="3291840"/>
         </p:xfrm>
         <a:graphic>
           <a:graphicData uri="http://schemas.openxmlformats.org/drawingml/2006/table">
@@ -11823,14 +11823,14 @@
                     </a:ext>
                   </a:extLst>
                 </a:gridCol>
-                <a:gridCol w="2997962">
+                <a:gridCol w="2858814">
                   <a:extLst>
                     <a:ext uri="{9D8B030D-6E8A-4147-A177-3AD203B41FA5}">
                       <a16:colId xmlns:a16="http://schemas.microsoft.com/office/drawing/2014/main" val="1610446745"/>
                     </a:ext>
                   </a:extLst>
                 </a:gridCol>
-                <a:gridCol w="3319669">
+                <a:gridCol w="3458817">
                   <a:extLst>
                     <a:ext uri="{9D8B030D-6E8A-4147-A177-3AD203B41FA5}">
                       <a16:colId xmlns:a16="http://schemas.microsoft.com/office/drawing/2014/main" val="3129042807"/>
@@ -11838,7 +11838,7 @@
                   </a:extLst>
                 </a:gridCol>
               </a:tblGrid>
-              <a:tr h="87035">
+              <a:tr h="144938">
                 <a:tc>
                   <a:txBody>
                     <a:bodyPr/>
@@ -12028,6 +12028,184 @@
                         </a:spcAft>
                       </a:pPr>
                       <a:r>
+                        <a:rPr lang="en-US" sz="1200" dirty="0">
+                          <a:effectLst/>
+                          <a:latin typeface="Calibri" panose="020F0502020204030204" pitchFamily="34" charset="0"/>
+                          <a:ea typeface="Calibri" panose="020F0502020204030204" pitchFamily="34" charset="0"/>
+                          <a:cs typeface="Times New Roman" panose="02020603050405020304" pitchFamily="18" charset="0"/>
+                        </a:rPr>
+                        <a:t>0</a:t>
+                      </a:r>
+                    </a:p>
+                  </a:txBody>
+                  <a:tcPr marL="68580" marR="68580" marT="0" marB="0"/>
+                </a:tc>
+                <a:tc>
+                  <a:txBody>
+                    <a:bodyPr/>
+                    <a:lstStyle/>
+                    <a:p>
+                      <a:pPr marL="0" marR="0" algn="ctr">
+                        <a:spcBef>
+                          <a:spcPts val="0"/>
+                        </a:spcBef>
+                        <a:spcAft>
+                          <a:spcPts val="0"/>
+                        </a:spcAft>
+                      </a:pPr>
+                      <a:r>
+                        <a:rPr lang="en-US" sz="1200" dirty="0">
+                          <a:effectLst/>
+                          <a:latin typeface="Calibri" panose="020F0502020204030204" pitchFamily="34" charset="0"/>
+                          <a:ea typeface="Calibri" panose="020F0502020204030204" pitchFamily="34" charset="0"/>
+                          <a:cs typeface="Times New Roman" panose="02020603050405020304" pitchFamily="18" charset="0"/>
+                        </a:rPr>
+                        <a:t>Reset DTI command buffer</a:t>
+                      </a:r>
+                    </a:p>
+                  </a:txBody>
+                  <a:tcPr marL="68580" marR="68580" marT="0" marB="0"/>
+                </a:tc>
+                <a:tc>
+                  <a:txBody>
+                    <a:bodyPr/>
+                    <a:lstStyle/>
+                    <a:p>
+                      <a:pPr marL="0" marR="0" algn="ctr">
+                        <a:spcBef>
+                          <a:spcPts val="0"/>
+                        </a:spcBef>
+                        <a:spcAft>
+                          <a:spcPts val="0"/>
+                        </a:spcAft>
+                      </a:pPr>
+                      <a:endParaRPr lang="en-US" sz="1200" dirty="0">
+                        <a:solidFill>
+                          <a:srgbClr val="FF0000"/>
+                        </a:solidFill>
+                        <a:effectLst/>
+                        <a:latin typeface="Calibri" panose="020F0502020204030204" pitchFamily="34" charset="0"/>
+                        <a:ea typeface="Calibri" panose="020F0502020204030204" pitchFamily="34" charset="0"/>
+                        <a:cs typeface="Times New Roman" panose="02020603050405020304" pitchFamily="18" charset="0"/>
+                      </a:endParaRPr>
+                    </a:p>
+                  </a:txBody>
+                  <a:tcPr marL="68580" marR="68580" marT="0" marB="0"/>
+                </a:tc>
+                <a:tc>
+                  <a:txBody>
+                    <a:bodyPr/>
+                    <a:lstStyle/>
+                    <a:p>
+                      <a:pPr marL="0" marR="0" algn="ctr">
+                        <a:spcBef>
+                          <a:spcPts val="0"/>
+                        </a:spcBef>
+                        <a:spcAft>
+                          <a:spcPts val="0"/>
+                        </a:spcAft>
+                      </a:pPr>
+                      <a:endParaRPr lang="en-US" sz="1200" dirty="0">
+                        <a:effectLst/>
+                        <a:latin typeface="Calibri" panose="020F0502020204030204" pitchFamily="34" charset="0"/>
+                        <a:ea typeface="Calibri" panose="020F0502020204030204" pitchFamily="34" charset="0"/>
+                        <a:cs typeface="Times New Roman" panose="02020603050405020304" pitchFamily="18" charset="0"/>
+                      </a:endParaRPr>
+                    </a:p>
+                  </a:txBody>
+                  <a:tcPr marL="68580" marR="68580" marT="0" marB="0"/>
+                </a:tc>
+                <a:tc>
+                  <a:txBody>
+                    <a:bodyPr/>
+                    <a:lstStyle/>
+                    <a:p>
+                      <a:pPr marL="0" marR="0" lvl="0" indent="0" algn="l" defTabSz="609443" rtl="0" eaLnBrk="1" fontAlgn="auto" latinLnBrk="0" hangingPunct="1">
+                        <a:lnSpc>
+                          <a:spcPct val="100000"/>
+                        </a:lnSpc>
+                        <a:spcBef>
+                          <a:spcPts val="0"/>
+                        </a:spcBef>
+                        <a:spcAft>
+                          <a:spcPts val="0"/>
+                        </a:spcAft>
+                        <a:buClrTx/>
+                        <a:buSzTx/>
+                        <a:buFontTx/>
+                        <a:buNone/>
+                        <a:tabLst/>
+                        <a:defRPr/>
+                      </a:pPr>
+                      <a:r>
+                        <a:rPr lang="en-US" sz="1200" dirty="0">
+                          <a:effectLst/>
+                          <a:latin typeface="Courier" pitchFamily="2" charset="0"/>
+                          <a:ea typeface="Calibri" panose="020F0502020204030204" pitchFamily="34" charset="0"/>
+                          <a:cs typeface="Times New Roman" panose="02020603050405020304" pitchFamily="18" charset="0"/>
+                        </a:rPr>
+                        <a:t>&gt;telemetry 0,0</a:t>
+                      </a:r>
+                    </a:p>
+                  </a:txBody>
+                  <a:tcPr marL="68580" marR="68580" marT="0" marB="0"/>
+                </a:tc>
+                <a:tc>
+                  <a:txBody>
+                    <a:bodyPr/>
+                    <a:lstStyle/>
+                    <a:p>
+                      <a:pPr marL="0" marR="0" lvl="0" indent="0" algn="ctr" defTabSz="609443" rtl="0" eaLnBrk="1" fontAlgn="auto" latinLnBrk="0" hangingPunct="1">
+                        <a:lnSpc>
+                          <a:spcPct val="100000"/>
+                        </a:lnSpc>
+                        <a:spcBef>
+                          <a:spcPts val="0"/>
+                        </a:spcBef>
+                        <a:spcAft>
+                          <a:spcPts val="0"/>
+                        </a:spcAft>
+                        <a:buClrTx/>
+                        <a:buSzTx/>
+                        <a:buFontTx/>
+                        <a:buNone/>
+                        <a:tabLst/>
+                        <a:defRPr/>
+                      </a:pPr>
+                      <a:r>
+                        <a:rPr lang="en-US" sz="1200" dirty="0">
+                          <a:effectLst/>
+                          <a:latin typeface="+mn-lt"/>
+                          <a:ea typeface="Calibri" panose="020F0502020204030204" pitchFamily="34" charset="0"/>
+                          <a:cs typeface="Times New Roman" panose="02020603050405020304" pitchFamily="18" charset="0"/>
+                        </a:rPr>
+                        <a:t>Recommended before sending out a DTI data frame</a:t>
+                      </a:r>
+                    </a:p>
+                  </a:txBody>
+                  <a:tcPr marL="68580" marR="68580" marT="0" marB="0"/>
+                </a:tc>
+                <a:extLst>
+                  <a:ext uri="{0D108BD9-81ED-4DB2-BD59-A6C34878D82A}">
+                    <a16:rowId xmlns:a16="http://schemas.microsoft.com/office/drawing/2014/main" val="2188356350"/>
+                  </a:ext>
+                </a:extLst>
+              </a:tr>
+              <a:tr h="0">
+                <a:tc>
+                  <a:txBody>
+                    <a:bodyPr/>
+                    <a:lstStyle/>
+                    <a:p>
+                      <a:pPr marL="0" marR="0" algn="ctr">
+                        <a:spcBef>
+                          <a:spcPts val="0"/>
+                        </a:spcBef>
+                        <a:spcAft>
+                          <a:spcPts val="0"/>
+                        </a:spcAft>
+                      </a:pPr>
+                      <a:r>
                         <a:rPr lang="en-US" sz="1200">
                           <a:effectLst/>
                         </a:rPr>
@@ -12057,12 +12235,12 @@
                         </a:spcAft>
                       </a:pPr>
                       <a:r>
-                        <a:rPr lang="en-US" sz="1200">
+                        <a:rPr lang="en-US" sz="1200" dirty="0">
                           <a:effectLst/>
                         </a:rPr>
                         <a:t>App Telemetry signed integer #1</a:t>
                       </a:r>
-                      <a:endParaRPr lang="en-US" sz="1200">
+                      <a:endParaRPr lang="en-US" sz="1200" dirty="0">
                         <a:effectLst/>
                         <a:latin typeface="Calibri" panose="020F0502020204030204" pitchFamily="34" charset="0"/>
                         <a:ea typeface="Calibri" panose="020F0502020204030204" pitchFamily="34" charset="0"/>
@@ -15239,7 +15417,7 @@
         </p:nvSpPr>
         <p:spPr>
           <a:xfrm>
-            <a:off x="682520" y="5216320"/>
+            <a:off x="682521" y="5537942"/>
             <a:ext cx="11005896" cy="400110"/>
           </a:xfrm>
           <a:prstGeom prst="rect">
@@ -32897,11 +33075,48 @@
 
 <file path=customXml/item2.xml><?xml version="1.0" encoding="utf-8"?>
 <?mso-contentType ?>
-<FormTemplates xmlns="http://schemas.microsoft.com/sharepoint/v3/contenttype/forms">
-  <Display>DocumentLibraryForm</Display>
-  <Edit>DocumentLibraryForm</Edit>
-  <New>DocumentLibraryForm</New>
-</FormTemplates>
+<spe:Receivers xmlns:spe="http://schemas.microsoft.com/sharepoint/events">
+  <Receiver>
+    <Name>Document ID Generator</Name>
+    <Synchronization>Synchronous</Synchronization>
+    <Type>10001</Type>
+    <SequenceNumber>1000</SequenceNumber>
+    <Assembly>Microsoft.Office.DocumentManagement, Version=14.0.0.0, Culture=neutral, PublicKeyToken=71e9bce111e9429c</Assembly>
+    <Class>Microsoft.Office.DocumentManagement.Internal.DocIdHandler</Class>
+    <Data/>
+    <Filter/>
+  </Receiver>
+  <Receiver>
+    <Name>Document ID Generator</Name>
+    <Synchronization>Synchronous</Synchronization>
+    <Type>10002</Type>
+    <SequenceNumber>1001</SequenceNumber>
+    <Assembly>Microsoft.Office.DocumentManagement, Version=14.0.0.0, Culture=neutral, PublicKeyToken=71e9bce111e9429c</Assembly>
+    <Class>Microsoft.Office.DocumentManagement.Internal.DocIdHandler</Class>
+    <Data/>
+    <Filter/>
+  </Receiver>
+  <Receiver>
+    <Name>Document ID Generator</Name>
+    <Synchronization>Synchronous</Synchronization>
+    <Type>10004</Type>
+    <SequenceNumber>1002</SequenceNumber>
+    <Assembly>Microsoft.Office.DocumentManagement, Version=14.0.0.0, Culture=neutral, PublicKeyToken=71e9bce111e9429c</Assembly>
+    <Class>Microsoft.Office.DocumentManagement.Internal.DocIdHandler</Class>
+    <Data/>
+    <Filter/>
+  </Receiver>
+  <Receiver>
+    <Name>Document ID Generator</Name>
+    <Synchronization>Synchronous</Synchronization>
+    <Type>10006</Type>
+    <SequenceNumber>1003</SequenceNumber>
+    <Assembly>Microsoft.Office.DocumentManagement, Version=14.0.0.0, Culture=neutral, PublicKeyToken=71e9bce111e9429c</Assembly>
+    <Class>Microsoft.Office.DocumentManagement.Internal.DocIdHandler</Class>
+    <Data/>
+    <Filter/>
+  </Receiver>
+</spe:Receivers>
 </file>
 
 <file path=customXml/item3.xml><?xml version="1.0" encoding="utf-8"?>
@@ -33062,48 +33277,11 @@
 
 <file path=customXml/item4.xml><?xml version="1.0" encoding="utf-8"?>
 <?mso-contentType ?>
-<spe:Receivers xmlns:spe="http://schemas.microsoft.com/sharepoint/events">
-  <Receiver>
-    <Name>Document ID Generator</Name>
-    <Synchronization>Synchronous</Synchronization>
-    <Type>10001</Type>
-    <SequenceNumber>1000</SequenceNumber>
-    <Assembly>Microsoft.Office.DocumentManagement, Version=14.0.0.0, Culture=neutral, PublicKeyToken=71e9bce111e9429c</Assembly>
-    <Class>Microsoft.Office.DocumentManagement.Internal.DocIdHandler</Class>
-    <Data/>
-    <Filter/>
-  </Receiver>
-  <Receiver>
-    <Name>Document ID Generator</Name>
-    <Synchronization>Synchronous</Synchronization>
-    <Type>10002</Type>
-    <SequenceNumber>1001</SequenceNumber>
-    <Assembly>Microsoft.Office.DocumentManagement, Version=14.0.0.0, Culture=neutral, PublicKeyToken=71e9bce111e9429c</Assembly>
-    <Class>Microsoft.Office.DocumentManagement.Internal.DocIdHandler</Class>
-    <Data/>
-    <Filter/>
-  </Receiver>
-  <Receiver>
-    <Name>Document ID Generator</Name>
-    <Synchronization>Synchronous</Synchronization>
-    <Type>10004</Type>
-    <SequenceNumber>1002</SequenceNumber>
-    <Assembly>Microsoft.Office.DocumentManagement, Version=14.0.0.0, Culture=neutral, PublicKeyToken=71e9bce111e9429c</Assembly>
-    <Class>Microsoft.Office.DocumentManagement.Internal.DocIdHandler</Class>
-    <Data/>
-    <Filter/>
-  </Receiver>
-  <Receiver>
-    <Name>Document ID Generator</Name>
-    <Synchronization>Synchronous</Synchronization>
-    <Type>10006</Type>
-    <SequenceNumber>1003</SequenceNumber>
-    <Assembly>Microsoft.Office.DocumentManagement, Version=14.0.0.0, Culture=neutral, PublicKeyToken=71e9bce111e9429c</Assembly>
-    <Class>Microsoft.Office.DocumentManagement.Internal.DocIdHandler</Class>
-    <Data/>
-    <Filter/>
-  </Receiver>
-</spe:Receivers>
+<FormTemplates xmlns="http://schemas.microsoft.com/sharepoint/v3/contenttype/forms">
+  <Display>DocumentLibraryForm</Display>
+  <Edit>DocumentLibraryForm</Edit>
+  <New>DocumentLibraryForm</New>
+</FormTemplates>
 </file>
 
 <file path=customXml/itemProps1.xml><?xml version="1.0" encoding="utf-8"?>
@@ -33118,9 +33296,9 @@
 </file>
 
 <file path=customXml/itemProps2.xml><?xml version="1.0" encoding="utf-8"?>
-<ds:datastoreItem xmlns:ds="http://schemas.openxmlformats.org/officeDocument/2006/customXml" ds:itemID="{0CE24DD7-9317-4AD8-82D4-5A6998DA79C7}">
+<ds:datastoreItem xmlns:ds="http://schemas.openxmlformats.org/officeDocument/2006/customXml" ds:itemID="{36ECED7C-7E24-4B80-B6AD-5BF0A508FB7B}">
   <ds:schemaRefs>
-    <ds:schemaRef ds:uri="http://schemas.microsoft.com/sharepoint/v3/contenttype/forms"/>
+    <ds:schemaRef ds:uri="http://schemas.microsoft.com/sharepoint/events"/>
   </ds:schemaRefs>
 </ds:datastoreItem>
 </file>
@@ -33145,9 +33323,9 @@
 </file>
 
 <file path=customXml/itemProps4.xml><?xml version="1.0" encoding="utf-8"?>
-<ds:datastoreItem xmlns:ds="http://schemas.openxmlformats.org/officeDocument/2006/customXml" ds:itemID="{36ECED7C-7E24-4B80-B6AD-5BF0A508FB7B}">
+<ds:datastoreItem xmlns:ds="http://schemas.openxmlformats.org/officeDocument/2006/customXml" ds:itemID="{0CE24DD7-9317-4AD8-82D4-5A6998DA79C7}">
   <ds:schemaRefs>
-    <ds:schemaRef ds:uri="http://schemas.microsoft.com/sharepoint/events"/>
+    <ds:schemaRef ds:uri="http://schemas.microsoft.com/sharepoint/v3/contenttype/forms"/>
   </ds:schemaRefs>
 </ds:datastoreItem>
 </file>
</xml_diff>

<commit_message>
Refractor FRAME to DTI
</commit_message>
<xml_diff>
--- a/AO-Smith-MSFT-MCHP-r6.pptx
+++ b/AO-Smith-MSFT-MCHP-r6.pptx
@@ -510,7 +510,7 @@
           <a:p>
             <a:fld id="{98615C2D-FB91-8740-95C2-23C11A10F2F2}" type="datetimeFigureOut">
               <a:rPr lang="en-US" smtClean="0"/>
-              <a:t>11/2/21</a:t>
+              <a:t>11/3/21</a:t>
             </a:fld>
             <a:endParaRPr lang="en-US"/>
           </a:p>
@@ -688,7 +688,7 @@
           <a:p>
             <a:fld id="{F154E49F-5C3A-ED4E-A68A-CCB3AA3B5D59}" type="datetimeFigureOut">
               <a:rPr lang="en-US" smtClean="0"/>
-              <a:t>11/2/21</a:t>
+              <a:t>11/3/21</a:t>
             </a:fld>
             <a:endParaRPr lang="en-US"/>
           </a:p>
@@ -5568,8 +5568,11 @@
           <a:p>
             <a:r>
               <a:rPr lang="en-US" dirty="0"/>
-              <a:t>October 2021</a:t>
-            </a:r>
+              <a:t>Wireless Specialist (PACNW)</a:t>
+            </a:r>
+          </a:p>
+          <a:p>
+            <a:endParaRPr lang="en-US" dirty="0"/>
           </a:p>
         </p:txBody>
       </p:sp>
@@ -5596,7 +5599,7 @@
           <a:p>
             <a:r>
               <a:rPr lang="en-US" dirty="0"/>
-              <a:t>JR &amp; RW</a:t>
+              <a:t>Randy Wu, Principal ESE</a:t>
             </a:r>
           </a:p>
         </p:txBody>
@@ -33209,11 +33212,48 @@
 
 <file path=customXml/item2.xml><?xml version="1.0" encoding="utf-8"?>
 <?mso-contentType ?>
-<FormTemplates xmlns="http://schemas.microsoft.com/sharepoint/v3/contenttype/forms">
-  <Display>DocumentLibraryForm</Display>
-  <Edit>DocumentLibraryForm</Edit>
-  <New>DocumentLibraryForm</New>
-</FormTemplates>
+<spe:Receivers xmlns:spe="http://schemas.microsoft.com/sharepoint/events">
+  <Receiver>
+    <Name>Document ID Generator</Name>
+    <Synchronization>Synchronous</Synchronization>
+    <Type>10001</Type>
+    <SequenceNumber>1000</SequenceNumber>
+    <Assembly>Microsoft.Office.DocumentManagement, Version=14.0.0.0, Culture=neutral, PublicKeyToken=71e9bce111e9429c</Assembly>
+    <Class>Microsoft.Office.DocumentManagement.Internal.DocIdHandler</Class>
+    <Data/>
+    <Filter/>
+  </Receiver>
+  <Receiver>
+    <Name>Document ID Generator</Name>
+    <Synchronization>Synchronous</Synchronization>
+    <Type>10002</Type>
+    <SequenceNumber>1001</SequenceNumber>
+    <Assembly>Microsoft.Office.DocumentManagement, Version=14.0.0.0, Culture=neutral, PublicKeyToken=71e9bce111e9429c</Assembly>
+    <Class>Microsoft.Office.DocumentManagement.Internal.DocIdHandler</Class>
+    <Data/>
+    <Filter/>
+  </Receiver>
+  <Receiver>
+    <Name>Document ID Generator</Name>
+    <Synchronization>Synchronous</Synchronization>
+    <Type>10004</Type>
+    <SequenceNumber>1002</SequenceNumber>
+    <Assembly>Microsoft.Office.DocumentManagement, Version=14.0.0.0, Culture=neutral, PublicKeyToken=71e9bce111e9429c</Assembly>
+    <Class>Microsoft.Office.DocumentManagement.Internal.DocIdHandler</Class>
+    <Data/>
+    <Filter/>
+  </Receiver>
+  <Receiver>
+    <Name>Document ID Generator</Name>
+    <Synchronization>Synchronous</Synchronization>
+    <Type>10006</Type>
+    <SequenceNumber>1003</SequenceNumber>
+    <Assembly>Microsoft.Office.DocumentManagement, Version=14.0.0.0, Culture=neutral, PublicKeyToken=71e9bce111e9429c</Assembly>
+    <Class>Microsoft.Office.DocumentManagement.Internal.DocIdHandler</Class>
+    <Data/>
+    <Filter/>
+  </Receiver>
+</spe:Receivers>
 </file>
 
 <file path=customXml/item3.xml><?xml version="1.0" encoding="utf-8"?>
@@ -33374,48 +33414,11 @@
 
 <file path=customXml/item4.xml><?xml version="1.0" encoding="utf-8"?>
 <?mso-contentType ?>
-<spe:Receivers xmlns:spe="http://schemas.microsoft.com/sharepoint/events">
-  <Receiver>
-    <Name>Document ID Generator</Name>
-    <Synchronization>Synchronous</Synchronization>
-    <Type>10001</Type>
-    <SequenceNumber>1000</SequenceNumber>
-    <Assembly>Microsoft.Office.DocumentManagement, Version=14.0.0.0, Culture=neutral, PublicKeyToken=71e9bce111e9429c</Assembly>
-    <Class>Microsoft.Office.DocumentManagement.Internal.DocIdHandler</Class>
-    <Data/>
-    <Filter/>
-  </Receiver>
-  <Receiver>
-    <Name>Document ID Generator</Name>
-    <Synchronization>Synchronous</Synchronization>
-    <Type>10002</Type>
-    <SequenceNumber>1001</SequenceNumber>
-    <Assembly>Microsoft.Office.DocumentManagement, Version=14.0.0.0, Culture=neutral, PublicKeyToken=71e9bce111e9429c</Assembly>
-    <Class>Microsoft.Office.DocumentManagement.Internal.DocIdHandler</Class>
-    <Data/>
-    <Filter/>
-  </Receiver>
-  <Receiver>
-    <Name>Document ID Generator</Name>
-    <Synchronization>Synchronous</Synchronization>
-    <Type>10004</Type>
-    <SequenceNumber>1002</SequenceNumber>
-    <Assembly>Microsoft.Office.DocumentManagement, Version=14.0.0.0, Culture=neutral, PublicKeyToken=71e9bce111e9429c</Assembly>
-    <Class>Microsoft.Office.DocumentManagement.Internal.DocIdHandler</Class>
-    <Data/>
-    <Filter/>
-  </Receiver>
-  <Receiver>
-    <Name>Document ID Generator</Name>
-    <Synchronization>Synchronous</Synchronization>
-    <Type>10006</Type>
-    <SequenceNumber>1003</SequenceNumber>
-    <Assembly>Microsoft.Office.DocumentManagement, Version=14.0.0.0, Culture=neutral, PublicKeyToken=71e9bce111e9429c</Assembly>
-    <Class>Microsoft.Office.DocumentManagement.Internal.DocIdHandler</Class>
-    <Data/>
-    <Filter/>
-  </Receiver>
-</spe:Receivers>
+<FormTemplates xmlns="http://schemas.microsoft.com/sharepoint/v3/contenttype/forms">
+  <Display>DocumentLibraryForm</Display>
+  <Edit>DocumentLibraryForm</Edit>
+  <New>DocumentLibraryForm</New>
+</FormTemplates>
 </file>
 
 <file path=customXml/itemProps1.xml><?xml version="1.0" encoding="utf-8"?>
@@ -33430,9 +33433,9 @@
 </file>
 
 <file path=customXml/itemProps2.xml><?xml version="1.0" encoding="utf-8"?>
-<ds:datastoreItem xmlns:ds="http://schemas.openxmlformats.org/officeDocument/2006/customXml" ds:itemID="{0CE24DD7-9317-4AD8-82D4-5A6998DA79C7}">
+<ds:datastoreItem xmlns:ds="http://schemas.openxmlformats.org/officeDocument/2006/customXml" ds:itemID="{36ECED7C-7E24-4B80-B6AD-5BF0A508FB7B}">
   <ds:schemaRefs>
-    <ds:schemaRef ds:uri="http://schemas.microsoft.com/sharepoint/v3/contenttype/forms"/>
+    <ds:schemaRef ds:uri="http://schemas.microsoft.com/sharepoint/events"/>
   </ds:schemaRefs>
 </ds:datastoreItem>
 </file>
@@ -33457,9 +33460,9 @@
 </file>
 
 <file path=customXml/itemProps4.xml><?xml version="1.0" encoding="utf-8"?>
-<ds:datastoreItem xmlns:ds="http://schemas.openxmlformats.org/officeDocument/2006/customXml" ds:itemID="{36ECED7C-7E24-4B80-B6AD-5BF0A508FB7B}">
+<ds:datastoreItem xmlns:ds="http://schemas.openxmlformats.org/officeDocument/2006/customXml" ds:itemID="{0CE24DD7-9317-4AD8-82D4-5A6998DA79C7}">
   <ds:schemaRefs>
-    <ds:schemaRef ds:uri="http://schemas.microsoft.com/sharepoint/events"/>
+    <ds:schemaRef ds:uri="http://schemas.microsoft.com/sharepoint/v3/contenttype/forms"/>
   </ds:schemaRefs>
 </ds:datastoreItem>
 </file>
</xml_diff>

<commit_message>
Reduce heap size to 2KB (#5)
</commit_message>
<xml_diff>
--- a/AO-Smith-MSFT-MCHP-r6.pptx
+++ b/AO-Smith-MSFT-MCHP-r6.pptx
@@ -5,10 +5,10 @@
     <p:sldMasterId id="2147483648" r:id="rId5"/>
   </p:sldMasterIdLst>
   <p:notesMasterIdLst>
-    <p:notesMasterId r:id="rId28"/>
+    <p:notesMasterId r:id="rId30"/>
   </p:notesMasterIdLst>
   <p:handoutMasterIdLst>
-    <p:handoutMasterId r:id="rId29"/>
+    <p:handoutMasterId r:id="rId31"/>
   </p:handoutMasterIdLst>
   <p:sldIdLst>
     <p:sldId id="1954" r:id="rId6"/>
@@ -33,6 +33,8 @@
     <p:sldId id="1976" r:id="rId25"/>
     <p:sldId id="2146846836" r:id="rId26"/>
     <p:sldId id="2146846835" r:id="rId27"/>
+    <p:sldId id="2146846842" r:id="rId28"/>
+    <p:sldId id="2146846843" r:id="rId29"/>
   </p:sldIdLst>
   <p:sldSz cx="12188825" cy="6858000"/>
   <p:notesSz cx="6858000" cy="9144000"/>
@@ -510,7 +512,7 @@
           <a:p>
             <a:fld id="{98615C2D-FB91-8740-95C2-23C11A10F2F2}" type="datetimeFigureOut">
               <a:rPr lang="en-US" smtClean="0"/>
-              <a:t>11/3/21</a:t>
+              <a:t>11/11/21</a:t>
             </a:fld>
             <a:endParaRPr lang="en-US"/>
           </a:p>
@@ -688,7 +690,7 @@
           <a:p>
             <a:fld id="{F154E49F-5C3A-ED4E-A68A-CCB3AA3B5D59}" type="datetimeFigureOut">
               <a:rPr lang="en-US" smtClean="0"/>
-              <a:t>11/3/21</a:t>
+              <a:t>11/11/21</a:t>
             </a:fld>
             <a:endParaRPr lang="en-US"/>
           </a:p>
@@ -11621,7 +11623,7 @@
           <p:nvPr>
             <p:extLst>
               <p:ext uri="{D42A27DB-BD31-4B8C-83A1-F6EECF244321}">
-                <p14:modId xmlns:p14="http://schemas.microsoft.com/office/powerpoint/2010/main" val="3514607525"/>
+                <p14:modId xmlns:p14="http://schemas.microsoft.com/office/powerpoint/2010/main" val="999834"/>
               </p:ext>
             </p:extLst>
           </p:nvPr>
@@ -11734,7 +11736,7 @@
                           </a:solidFill>
                           <a:latin typeface="Courier" pitchFamily="2" charset="0"/>
                         </a:rPr>
-                        <a:t>false (not connected to cloud)</a:t>
+                        <a:t>false</a:t>
                       </a:r>
                     </a:p>
                   </a:txBody>
@@ -11809,7 +11811,7 @@
                           </a:solidFill>
                           <a:latin typeface="Courier" pitchFamily="2" charset="0"/>
                         </a:rPr>
-                        <a:t>true (connected to cloud) </a:t>
+                        <a:t>true</a:t>
                       </a:r>
                     </a:p>
                   </a:txBody>
@@ -18718,7 +18720,7 @@
         </p:nvGrpSpPr>
         <p:grpSpPr>
           <a:xfrm>
-            <a:off x="10707651" y="940531"/>
+            <a:off x="10572901" y="940531"/>
             <a:ext cx="1498251" cy="944023"/>
             <a:chOff x="10707651" y="940531"/>
             <a:chExt cx="1498251" cy="944023"/>
@@ -18843,12 +18845,15 @@
               <a:r>
                 <a:rPr lang="en-US" sz="1800" dirty="0">
                   <a:solidFill>
-                    <a:srgbClr val="FF0000"/>
+                    <a:srgbClr val="FFFF00"/>
                   </a:solidFill>
+                  <a:highlight>
+                    <a:srgbClr val="C0C0C0"/>
+                  </a:highlight>
                   <a:latin typeface="Arial" panose="020B0604020202020204" pitchFamily="34" charset="0"/>
                   <a:cs typeface="Arial" panose="020B0604020202020204" pitchFamily="34" charset="0"/>
                 </a:rPr>
-                <a:t>Red</a:t>
+                <a:t>Yellow</a:t>
               </a:r>
               <a:r>
                 <a:rPr lang="en-US" sz="1800" dirty="0">
@@ -25494,6 +25499,1219 @@
       <p:bldP spid="20" grpId="0" animBg="1"/>
     </p:bldLst>
   </p:timing>
+</p:sld>
+</file>
+
+<file path=ppt/slides/slide23.xml><?xml version="1.0" encoding="utf-8"?>
+<p:sld xmlns:a="http://schemas.openxmlformats.org/drawingml/2006/main" xmlns:r="http://schemas.openxmlformats.org/officeDocument/2006/relationships" xmlns:p="http://schemas.openxmlformats.org/presentationml/2006/main">
+  <p:cSld>
+    <p:spTree>
+      <p:nvGrpSpPr>
+        <p:cNvPr id="1" name=""/>
+        <p:cNvGrpSpPr/>
+        <p:nvPr/>
+      </p:nvGrpSpPr>
+      <p:grpSpPr>
+        <a:xfrm>
+          <a:off x="0" y="0"/>
+          <a:ext cx="0" cy="0"/>
+          <a:chOff x="0" y="0"/>
+          <a:chExt cx="0" cy="0"/>
+        </a:xfrm>
+      </p:grpSpPr>
+      <p:sp>
+        <p:nvSpPr>
+          <p:cNvPr id="2" name="Title 1">
+            <a:extLst>
+              <a:ext uri="{FF2B5EF4-FFF2-40B4-BE49-F238E27FC236}">
+                <a16:creationId xmlns:a16="http://schemas.microsoft.com/office/drawing/2014/main" id="{95AC07ED-0E8F-3341-BD66-CC6F287C0B94}"/>
+              </a:ext>
+            </a:extLst>
+          </p:cNvPr>
+          <p:cNvSpPr>
+            <a:spLocks noGrp="1"/>
+          </p:cNvSpPr>
+          <p:nvPr>
+            <p:ph type="title"/>
+          </p:nvPr>
+        </p:nvSpPr>
+        <p:spPr/>
+        <p:txBody>
+          <a:bodyPr/>
+          <a:lstStyle/>
+          <a:p>
+            <a:r>
+              <a:rPr lang="en-US" dirty="0"/>
+              <a:t>Application MCU Connections to SAM-IoT</a:t>
+            </a:r>
+          </a:p>
+        </p:txBody>
+      </p:sp>
+      <p:pic>
+        <p:nvPicPr>
+          <p:cNvPr id="28" name="Picture 27">
+            <a:extLst>
+              <a:ext uri="{FF2B5EF4-FFF2-40B4-BE49-F238E27FC236}">
+                <a16:creationId xmlns:a16="http://schemas.microsoft.com/office/drawing/2014/main" id="{96F59593-74EE-4111-83B3-ACE4E019F2A4}"/>
+              </a:ext>
+            </a:extLst>
+          </p:cNvPr>
+          <p:cNvPicPr>
+            <a:picLocks noChangeAspect="1"/>
+          </p:cNvPicPr>
+          <p:nvPr/>
+        </p:nvPicPr>
+        <p:blipFill>
+          <a:blip r:embed="rId2"/>
+          <a:stretch>
+            <a:fillRect/>
+          </a:stretch>
+        </p:blipFill>
+        <p:spPr>
+          <a:xfrm rot="16200000">
+            <a:off x="6188969" y="1790991"/>
+            <a:ext cx="2733675" cy="1162050"/>
+          </a:xfrm>
+          <a:prstGeom prst="rect">
+            <a:avLst/>
+          </a:prstGeom>
+        </p:spPr>
+      </p:pic>
+      <p:sp>
+        <p:nvSpPr>
+          <p:cNvPr id="3" name="Cloud 2">
+            <a:extLst>
+              <a:ext uri="{FF2B5EF4-FFF2-40B4-BE49-F238E27FC236}">
+                <a16:creationId xmlns:a16="http://schemas.microsoft.com/office/drawing/2014/main" id="{31F5091D-CD34-E241-A496-934E4B669D2C}"/>
+              </a:ext>
+            </a:extLst>
+          </p:cNvPr>
+          <p:cNvSpPr/>
+          <p:nvPr/>
+        </p:nvSpPr>
+        <p:spPr>
+          <a:xfrm>
+            <a:off x="9736209" y="1585748"/>
+            <a:ext cx="2361523" cy="1693440"/>
+          </a:xfrm>
+          <a:prstGeom prst="cloud">
+            <a:avLst/>
+          </a:prstGeom>
+          <a:solidFill>
+            <a:schemeClr val="accent3">
+              <a:lumMod val="60000"/>
+              <a:lumOff val="40000"/>
+            </a:schemeClr>
+          </a:solidFill>
+          <a:ln>
+            <a:noFill/>
+          </a:ln>
+          <a:effectLst/>
+        </p:spPr>
+        <p:style>
+          <a:lnRef idx="1">
+            <a:schemeClr val="accent1"/>
+          </a:lnRef>
+          <a:fillRef idx="3">
+            <a:schemeClr val="accent1"/>
+          </a:fillRef>
+          <a:effectRef idx="2">
+            <a:schemeClr val="accent1"/>
+          </a:effectRef>
+          <a:fontRef idx="minor">
+            <a:schemeClr val="lt1"/>
+          </a:fontRef>
+        </p:style>
+        <p:txBody>
+          <a:bodyPr rot="0" spcFirstLastPara="0" vertOverflow="overflow" horzOverflow="overflow" vert="horz" wrap="square" lIns="91440" tIns="45720" rIns="91440" bIns="45720" numCol="1" spcCol="0" rtlCol="0" fromWordArt="0" anchor="ctr" anchorCtr="0" forceAA="0" compatLnSpc="1">
+            <a:prstTxWarp prst="textNoShape">
+              <a:avLst/>
+            </a:prstTxWarp>
+            <a:noAutofit/>
+          </a:bodyPr>
+          <a:lstStyle/>
+          <a:p>
+            <a:pPr algn="ctr"/>
+            <a:r>
+              <a:rPr lang="en-US" dirty="0"/>
+              <a:t>Azure Cloud</a:t>
+            </a:r>
+          </a:p>
+        </p:txBody>
+      </p:sp>
+      <p:sp>
+        <p:nvSpPr>
+          <p:cNvPr id="16" name="Rectangle 15">
+            <a:extLst>
+              <a:ext uri="{FF2B5EF4-FFF2-40B4-BE49-F238E27FC236}">
+                <a16:creationId xmlns:a16="http://schemas.microsoft.com/office/drawing/2014/main" id="{EC6B95A8-CB8D-DA4B-8131-E8699978C57B}"/>
+              </a:ext>
+            </a:extLst>
+          </p:cNvPr>
+          <p:cNvSpPr/>
+          <p:nvPr/>
+        </p:nvSpPr>
+        <p:spPr>
+          <a:xfrm>
+            <a:off x="473035" y="1078031"/>
+            <a:ext cx="2620597" cy="2502568"/>
+          </a:xfrm>
+          <a:prstGeom prst="rect">
+            <a:avLst/>
+          </a:prstGeom>
+        </p:spPr>
+        <p:style>
+          <a:lnRef idx="2">
+            <a:schemeClr val="accent1">
+              <a:shade val="50000"/>
+            </a:schemeClr>
+          </a:lnRef>
+          <a:fillRef idx="1">
+            <a:schemeClr val="accent1"/>
+          </a:fillRef>
+          <a:effectRef idx="0">
+            <a:schemeClr val="accent1"/>
+          </a:effectRef>
+          <a:fontRef idx="minor">
+            <a:schemeClr val="lt1"/>
+          </a:fontRef>
+        </p:style>
+        <p:txBody>
+          <a:bodyPr rtlCol="0" anchor="ctr"/>
+          <a:lstStyle/>
+          <a:p>
+            <a:pPr algn="ctr"/>
+            <a:r>
+              <a:rPr lang="en-US" sz="2399" dirty="0"/>
+              <a:t>Application</a:t>
+            </a:r>
+          </a:p>
+          <a:p>
+            <a:pPr algn="ctr"/>
+            <a:r>
+              <a:rPr lang="en-US" sz="2399" dirty="0"/>
+              <a:t>MCU</a:t>
+            </a:r>
+          </a:p>
+        </p:txBody>
+      </p:sp>
+      <p:sp>
+        <p:nvSpPr>
+          <p:cNvPr id="17" name="Left-Right Arrow 16">
+            <a:extLst>
+              <a:ext uri="{FF2B5EF4-FFF2-40B4-BE49-F238E27FC236}">
+                <a16:creationId xmlns:a16="http://schemas.microsoft.com/office/drawing/2014/main" id="{51EFD0E5-9363-2E4C-AC47-0E9FD905EFAF}"/>
+              </a:ext>
+            </a:extLst>
+          </p:cNvPr>
+          <p:cNvSpPr/>
+          <p:nvPr/>
+        </p:nvSpPr>
+        <p:spPr>
+          <a:xfrm>
+            <a:off x="3093632" y="1257046"/>
+            <a:ext cx="3973776" cy="902958"/>
+          </a:xfrm>
+          <a:prstGeom prst="leftRightArrow">
+            <a:avLst/>
+          </a:prstGeom>
+          <a:solidFill>
+            <a:srgbClr val="92D050"/>
+          </a:solidFill>
+          <a:ln>
+            <a:noFill/>
+          </a:ln>
+          <a:effectLst/>
+        </p:spPr>
+        <p:style>
+          <a:lnRef idx="1">
+            <a:schemeClr val="accent1"/>
+          </a:lnRef>
+          <a:fillRef idx="3">
+            <a:schemeClr val="accent1"/>
+          </a:fillRef>
+          <a:effectRef idx="2">
+            <a:schemeClr val="accent1"/>
+          </a:effectRef>
+          <a:fontRef idx="minor">
+            <a:schemeClr val="lt1"/>
+          </a:fontRef>
+        </p:style>
+        <p:txBody>
+          <a:bodyPr rot="0" spcFirstLastPara="0" vertOverflow="overflow" horzOverflow="overflow" vert="horz" wrap="square" lIns="91440" tIns="45720" rIns="91440" bIns="45720" numCol="1" spcCol="0" rtlCol="0" fromWordArt="0" anchor="ctr" anchorCtr="0" forceAA="0" compatLnSpc="1">
+            <a:prstTxWarp prst="textNoShape">
+              <a:avLst/>
+            </a:prstTxWarp>
+            <a:noAutofit/>
+          </a:bodyPr>
+          <a:lstStyle/>
+          <a:p>
+            <a:pPr algn="ctr"/>
+            <a:r>
+              <a:rPr lang="en-US" sz="2000" dirty="0">
+                <a:solidFill>
+                  <a:schemeClr val="tx1"/>
+                </a:solidFill>
+                <a:latin typeface="Arial" panose="020B0604020202020204" pitchFamily="34" charset="0"/>
+                <a:cs typeface="Arial" panose="020B0604020202020204" pitchFamily="34" charset="0"/>
+              </a:rPr>
+              <a:t>UART (9600 baud)</a:t>
+            </a:r>
+          </a:p>
+        </p:txBody>
+      </p:sp>
+      <p:sp>
+        <p:nvSpPr>
+          <p:cNvPr id="12" name="Right Arrow 11">
+            <a:extLst>
+              <a:ext uri="{FF2B5EF4-FFF2-40B4-BE49-F238E27FC236}">
+                <a16:creationId xmlns:a16="http://schemas.microsoft.com/office/drawing/2014/main" id="{DD522764-5960-0443-B74A-1F6C7CA3D19D}"/>
+              </a:ext>
+            </a:extLst>
+          </p:cNvPr>
+          <p:cNvSpPr/>
+          <p:nvPr/>
+        </p:nvSpPr>
+        <p:spPr>
+          <a:xfrm>
+            <a:off x="3101768" y="2411871"/>
+            <a:ext cx="3973775" cy="884917"/>
+          </a:xfrm>
+          <a:prstGeom prst="rightArrow">
+            <a:avLst/>
+          </a:prstGeom>
+          <a:solidFill>
+            <a:srgbClr val="92D050"/>
+          </a:solidFill>
+          <a:ln>
+            <a:noFill/>
+          </a:ln>
+          <a:effectLst/>
+        </p:spPr>
+        <p:style>
+          <a:lnRef idx="1">
+            <a:schemeClr val="accent1"/>
+          </a:lnRef>
+          <a:fillRef idx="3">
+            <a:schemeClr val="accent1"/>
+          </a:fillRef>
+          <a:effectRef idx="2">
+            <a:schemeClr val="accent1"/>
+          </a:effectRef>
+          <a:fontRef idx="minor">
+            <a:schemeClr val="lt1"/>
+          </a:fontRef>
+        </p:style>
+        <p:txBody>
+          <a:bodyPr rot="0" spcFirstLastPara="0" vertOverflow="overflow" horzOverflow="overflow" vert="horz" wrap="square" lIns="91440" tIns="45720" rIns="91440" bIns="45720" numCol="1" spcCol="0" rtlCol="0" fromWordArt="0" anchor="ctr" anchorCtr="0" forceAA="0" compatLnSpc="1">
+            <a:prstTxWarp prst="textNoShape">
+              <a:avLst/>
+            </a:prstTxWarp>
+            <a:noAutofit/>
+          </a:bodyPr>
+          <a:lstStyle/>
+          <a:p>
+            <a:pPr algn="ctr"/>
+            <a:r>
+              <a:rPr lang="en-US" sz="2000" dirty="0">
+                <a:solidFill>
+                  <a:schemeClr val="tx1"/>
+                </a:solidFill>
+                <a:latin typeface="Arial" panose="020B0604020202020204" pitchFamily="34" charset="0"/>
+                <a:cs typeface="Arial" panose="020B0604020202020204" pitchFamily="34" charset="0"/>
+              </a:rPr>
+              <a:t>SPI (30 kHz)</a:t>
+            </a:r>
+          </a:p>
+        </p:txBody>
+      </p:sp>
+      <p:sp>
+        <p:nvSpPr>
+          <p:cNvPr id="14" name="Rectangle 13">
+            <a:extLst>
+              <a:ext uri="{FF2B5EF4-FFF2-40B4-BE49-F238E27FC236}">
+                <a16:creationId xmlns:a16="http://schemas.microsoft.com/office/drawing/2014/main" id="{69C2272C-1E39-6743-B6A9-470432F360C4}"/>
+              </a:ext>
+            </a:extLst>
+          </p:cNvPr>
+          <p:cNvSpPr/>
+          <p:nvPr/>
+        </p:nvSpPr>
+        <p:spPr>
+          <a:xfrm rot="16200000">
+            <a:off x="2507131" y="1501637"/>
+            <a:ext cx="822957" cy="333774"/>
+          </a:xfrm>
+          <a:prstGeom prst="rect">
+            <a:avLst/>
+          </a:prstGeom>
+          <a:solidFill>
+            <a:srgbClr val="FF0000"/>
+          </a:solidFill>
+          <a:ln>
+            <a:noFill/>
+          </a:ln>
+          <a:effectLst/>
+        </p:spPr>
+        <p:style>
+          <a:lnRef idx="1">
+            <a:schemeClr val="accent1"/>
+          </a:lnRef>
+          <a:fillRef idx="3">
+            <a:schemeClr val="accent1"/>
+          </a:fillRef>
+          <a:effectRef idx="2">
+            <a:schemeClr val="accent1"/>
+          </a:effectRef>
+          <a:fontRef idx="minor">
+            <a:schemeClr val="lt1"/>
+          </a:fontRef>
+        </p:style>
+        <p:txBody>
+          <a:bodyPr rot="0" spcFirstLastPara="0" vertOverflow="overflow" horzOverflow="overflow" vert="horz" wrap="square" lIns="91440" tIns="45720" rIns="91440" bIns="45720" numCol="1" spcCol="0" rtlCol="0" fromWordArt="0" anchor="ctr" anchorCtr="0" forceAA="0" compatLnSpc="1">
+            <a:prstTxWarp prst="textNoShape">
+              <a:avLst/>
+            </a:prstTxWarp>
+            <a:noAutofit/>
+          </a:bodyPr>
+          <a:lstStyle/>
+          <a:p>
+            <a:pPr algn="ctr"/>
+            <a:r>
+              <a:rPr lang="en-US" dirty="0">
+                <a:solidFill>
+                  <a:srgbClr val="FFFF00"/>
+                </a:solidFill>
+              </a:rPr>
+              <a:t>CLI</a:t>
+            </a:r>
+          </a:p>
+        </p:txBody>
+      </p:sp>
+      <p:sp>
+        <p:nvSpPr>
+          <p:cNvPr id="15" name="Rectangle 14">
+            <a:extLst>
+              <a:ext uri="{FF2B5EF4-FFF2-40B4-BE49-F238E27FC236}">
+                <a16:creationId xmlns:a16="http://schemas.microsoft.com/office/drawing/2014/main" id="{3230BB7D-D6BB-C641-A65F-B749D5607A52}"/>
+              </a:ext>
+            </a:extLst>
+          </p:cNvPr>
+          <p:cNvSpPr/>
+          <p:nvPr/>
+        </p:nvSpPr>
+        <p:spPr>
+          <a:xfrm rot="16200000">
+            <a:off x="2507131" y="2718422"/>
+            <a:ext cx="822957" cy="333774"/>
+          </a:xfrm>
+          <a:prstGeom prst="rect">
+            <a:avLst/>
+          </a:prstGeom>
+          <a:solidFill>
+            <a:srgbClr val="FF0000"/>
+          </a:solidFill>
+          <a:ln>
+            <a:noFill/>
+          </a:ln>
+          <a:effectLst/>
+        </p:spPr>
+        <p:style>
+          <a:lnRef idx="1">
+            <a:schemeClr val="accent1"/>
+          </a:lnRef>
+          <a:fillRef idx="3">
+            <a:schemeClr val="accent1"/>
+          </a:fillRef>
+          <a:effectRef idx="2">
+            <a:schemeClr val="accent1"/>
+          </a:effectRef>
+          <a:fontRef idx="minor">
+            <a:schemeClr val="lt1"/>
+          </a:fontRef>
+        </p:style>
+        <p:txBody>
+          <a:bodyPr rot="0" spcFirstLastPara="0" vertOverflow="overflow" horzOverflow="overflow" vert="horz" wrap="square" lIns="91440" tIns="45720" rIns="91440" bIns="45720" numCol="1" spcCol="0" rtlCol="0" fromWordArt="0" anchor="ctr" anchorCtr="0" forceAA="0" compatLnSpc="1">
+            <a:prstTxWarp prst="textNoShape">
+              <a:avLst/>
+            </a:prstTxWarp>
+            <a:noAutofit/>
+          </a:bodyPr>
+          <a:lstStyle/>
+          <a:p>
+            <a:pPr algn="ctr"/>
+            <a:r>
+              <a:rPr lang="en-US" dirty="0">
+                <a:solidFill>
+                  <a:srgbClr val="FFFF00"/>
+                </a:solidFill>
+              </a:rPr>
+              <a:t>DTI</a:t>
+            </a:r>
+          </a:p>
+        </p:txBody>
+      </p:sp>
+      <p:graphicFrame>
+        <p:nvGraphicFramePr>
+          <p:cNvPr id="4" name="Table 4">
+            <a:extLst>
+              <a:ext uri="{FF2B5EF4-FFF2-40B4-BE49-F238E27FC236}">
+                <a16:creationId xmlns:a16="http://schemas.microsoft.com/office/drawing/2014/main" id="{4EC877B5-4166-0A45-9BD3-A7182CF9B009}"/>
+              </a:ext>
+            </a:extLst>
+          </p:cNvPr>
+          <p:cNvGraphicFramePr>
+            <a:graphicFrameLocks noGrp="1"/>
+          </p:cNvGraphicFramePr>
+          <p:nvPr>
+            <p:extLst>
+              <p:ext uri="{D42A27DB-BD31-4B8C-83A1-F6EECF244321}">
+                <p14:modId xmlns:p14="http://schemas.microsoft.com/office/powerpoint/2010/main" val="3227162272"/>
+              </p:ext>
+            </p:extLst>
+          </p:nvPr>
+        </p:nvGraphicFramePr>
+        <p:xfrm>
+          <a:off x="7075543" y="3648021"/>
+          <a:ext cx="4301518" cy="2743200"/>
+        </p:xfrm>
+        <a:graphic>
+          <a:graphicData uri="http://schemas.openxmlformats.org/drawingml/2006/table">
+            <a:tbl>
+              <a:tblPr firstRow="1" bandRow="1">
+                <a:tableStyleId>{5C22544A-7EE6-4342-B048-85BDC9FD1C3A}</a:tableStyleId>
+              </a:tblPr>
+              <a:tblGrid>
+                <a:gridCol w="1161007">
+                  <a:extLst>
+                    <a:ext uri="{9D8B030D-6E8A-4147-A177-3AD203B41FA5}">
+                      <a16:colId xmlns:a16="http://schemas.microsoft.com/office/drawing/2014/main" val="776691185"/>
+                    </a:ext>
+                  </a:extLst>
+                </a:gridCol>
+                <a:gridCol w="753485">
+                  <a:extLst>
+                    <a:ext uri="{9D8B030D-6E8A-4147-A177-3AD203B41FA5}">
+                      <a16:colId xmlns:a16="http://schemas.microsoft.com/office/drawing/2014/main" val="3955616158"/>
+                    </a:ext>
+                  </a:extLst>
+                </a:gridCol>
+                <a:gridCol w="996682">
+                  <a:extLst>
+                    <a:ext uri="{9D8B030D-6E8A-4147-A177-3AD203B41FA5}">
+                      <a16:colId xmlns:a16="http://schemas.microsoft.com/office/drawing/2014/main" val="1143551255"/>
+                    </a:ext>
+                  </a:extLst>
+                </a:gridCol>
+                <a:gridCol w="1390344">
+                  <a:extLst>
+                    <a:ext uri="{9D8B030D-6E8A-4147-A177-3AD203B41FA5}">
+                      <a16:colId xmlns:a16="http://schemas.microsoft.com/office/drawing/2014/main" val="1437559582"/>
+                    </a:ext>
+                  </a:extLst>
+                </a:gridCol>
+              </a:tblGrid>
+              <a:tr h="422409">
+                <a:tc>
+                  <a:txBody>
+                    <a:bodyPr/>
+                    <a:lstStyle/>
+                    <a:p>
+                      <a:pPr algn="ctr"/>
+                      <a:r>
+                        <a:rPr lang="en-US" dirty="0"/>
+                        <a:t>FUNC</a:t>
+                      </a:r>
+                    </a:p>
+                  </a:txBody>
+                  <a:tcPr/>
+                </a:tc>
+                <a:tc>
+                  <a:txBody>
+                    <a:bodyPr/>
+                    <a:lstStyle/>
+                    <a:p>
+                      <a:pPr algn="ctr"/>
+                      <a:r>
+                        <a:rPr lang="en-US" dirty="0"/>
+                        <a:t>DIR</a:t>
+                      </a:r>
+                    </a:p>
+                  </a:txBody>
+                  <a:tcPr/>
+                </a:tc>
+                <a:tc>
+                  <a:txBody>
+                    <a:bodyPr/>
+                    <a:lstStyle/>
+                    <a:p>
+                      <a:pPr algn="ctr"/>
+                      <a:r>
+                        <a:rPr lang="en-US" dirty="0"/>
+                        <a:t>PIN</a:t>
+                      </a:r>
+                    </a:p>
+                  </a:txBody>
+                  <a:tcPr/>
+                </a:tc>
+                <a:tc>
+                  <a:txBody>
+                    <a:bodyPr/>
+                    <a:lstStyle/>
+                    <a:p>
+                      <a:pPr algn="ctr"/>
+                      <a:r>
+                        <a:rPr lang="en-US" dirty="0"/>
+                        <a:t>HEADER</a:t>
+                      </a:r>
+                    </a:p>
+                  </a:txBody>
+                  <a:tcPr/>
+                </a:tc>
+                <a:extLst>
+                  <a:ext uri="{0D108BD9-81ED-4DB2-BD59-A6C34878D82A}">
+                    <a16:rowId xmlns:a16="http://schemas.microsoft.com/office/drawing/2014/main" val="2753504131"/>
+                  </a:ext>
+                </a:extLst>
+              </a:tr>
+              <a:tr h="370840">
+                <a:tc>
+                  <a:txBody>
+                    <a:bodyPr/>
+                    <a:lstStyle/>
+                    <a:p>
+                      <a:pPr algn="ctr"/>
+                      <a:r>
+                        <a:rPr lang="en-US" dirty="0"/>
+                        <a:t>TXD</a:t>
+                      </a:r>
+                    </a:p>
+                  </a:txBody>
+                  <a:tcPr/>
+                </a:tc>
+                <a:tc>
+                  <a:txBody>
+                    <a:bodyPr/>
+                    <a:lstStyle/>
+                    <a:p>
+                      <a:pPr algn="ctr"/>
+                      <a:r>
+                        <a:rPr lang="en-US" dirty="0">
+                          <a:sym typeface="Wingdings" pitchFamily="2" charset="2"/>
+                        </a:rPr>
+                        <a:t></a:t>
+                      </a:r>
+                      <a:endParaRPr lang="en-US" dirty="0"/>
+                    </a:p>
+                  </a:txBody>
+                  <a:tcPr/>
+                </a:tc>
+                <a:tc>
+                  <a:txBody>
+                    <a:bodyPr/>
+                    <a:lstStyle/>
+                    <a:p>
+                      <a:pPr algn="ctr"/>
+                      <a:r>
+                        <a:rPr lang="en-US" dirty="0"/>
+                        <a:t>PB02</a:t>
+                      </a:r>
+                    </a:p>
+                  </a:txBody>
+                  <a:tcPr/>
+                </a:tc>
+                <a:tc>
+                  <a:txBody>
+                    <a:bodyPr/>
+                    <a:lstStyle/>
+                    <a:p>
+                      <a:pPr algn="ctr"/>
+                      <a:r>
+                        <a:rPr lang="en-US" dirty="0"/>
+                        <a:t>N/A</a:t>
+                      </a:r>
+                    </a:p>
+                  </a:txBody>
+                  <a:tcPr/>
+                </a:tc>
+                <a:extLst>
+                  <a:ext uri="{0D108BD9-81ED-4DB2-BD59-A6C34878D82A}">
+                    <a16:rowId xmlns:a16="http://schemas.microsoft.com/office/drawing/2014/main" val="479758039"/>
+                  </a:ext>
+                </a:extLst>
+              </a:tr>
+              <a:tr h="370840">
+                <a:tc>
+                  <a:txBody>
+                    <a:bodyPr/>
+                    <a:lstStyle/>
+                    <a:p>
+                      <a:pPr algn="ctr"/>
+                      <a:r>
+                        <a:rPr lang="en-US" dirty="0"/>
+                        <a:t>RXD</a:t>
+                      </a:r>
+                    </a:p>
+                  </a:txBody>
+                  <a:tcPr/>
+                </a:tc>
+                <a:tc>
+                  <a:txBody>
+                    <a:bodyPr/>
+                    <a:lstStyle/>
+                    <a:p>
+                      <a:pPr algn="ctr"/>
+                      <a:r>
+                        <a:rPr lang="en-US" dirty="0">
+                          <a:sym typeface="Wingdings" pitchFamily="2" charset="2"/>
+                        </a:rPr>
+                        <a:t></a:t>
+                      </a:r>
+                      <a:endParaRPr lang="en-US" dirty="0"/>
+                    </a:p>
+                  </a:txBody>
+                  <a:tcPr/>
+                </a:tc>
+                <a:tc>
+                  <a:txBody>
+                    <a:bodyPr/>
+                    <a:lstStyle/>
+                    <a:p>
+                      <a:pPr algn="ctr"/>
+                      <a:r>
+                        <a:rPr lang="en-US" dirty="0"/>
+                        <a:t>PB03</a:t>
+                      </a:r>
+                    </a:p>
+                  </a:txBody>
+                  <a:tcPr/>
+                </a:tc>
+                <a:tc>
+                  <a:txBody>
+                    <a:bodyPr/>
+                    <a:lstStyle/>
+                    <a:p>
+                      <a:pPr algn="ctr"/>
+                      <a:r>
+                        <a:rPr lang="en-US" dirty="0"/>
+                        <a:t>N/A</a:t>
+                      </a:r>
+                    </a:p>
+                  </a:txBody>
+                  <a:tcPr/>
+                </a:tc>
+                <a:extLst>
+                  <a:ext uri="{0D108BD9-81ED-4DB2-BD59-A6C34878D82A}">
+                    <a16:rowId xmlns:a16="http://schemas.microsoft.com/office/drawing/2014/main" val="944408060"/>
+                  </a:ext>
+                </a:extLst>
+              </a:tr>
+              <a:tr h="370840">
+                <a:tc>
+                  <a:txBody>
+                    <a:bodyPr/>
+                    <a:lstStyle/>
+                    <a:p>
+                      <a:pPr algn="ctr"/>
+                      <a:r>
+                        <a:rPr lang="en-US" dirty="0"/>
+                        <a:t>MOSI</a:t>
+                      </a:r>
+                    </a:p>
+                  </a:txBody>
+                  <a:tcPr/>
+                </a:tc>
+                <a:tc>
+                  <a:txBody>
+                    <a:bodyPr/>
+                    <a:lstStyle/>
+                    <a:p>
+                      <a:pPr algn="ctr"/>
+                      <a:r>
+                        <a:rPr lang="en-US" dirty="0">
+                          <a:sym typeface="Wingdings" pitchFamily="2" charset="2"/>
+                        </a:rPr>
+                        <a:t></a:t>
+                      </a:r>
+                      <a:endParaRPr lang="en-US" dirty="0"/>
+                    </a:p>
+                  </a:txBody>
+                  <a:tcPr/>
+                </a:tc>
+                <a:tc>
+                  <a:txBody>
+                    <a:bodyPr/>
+                    <a:lstStyle/>
+                    <a:p>
+                      <a:pPr algn="ctr"/>
+                      <a:r>
+                        <a:rPr lang="en-US" dirty="0"/>
+                        <a:t>PA04</a:t>
+                      </a:r>
+                    </a:p>
+                  </a:txBody>
+                  <a:tcPr/>
+                </a:tc>
+                <a:tc>
+                  <a:txBody>
+                    <a:bodyPr/>
+                    <a:lstStyle/>
+                    <a:p>
+                      <a:pPr algn="ctr"/>
+                      <a:r>
+                        <a:rPr lang="en-US" dirty="0"/>
+                        <a:t>J20-6</a:t>
+                      </a:r>
+                    </a:p>
+                  </a:txBody>
+                  <a:tcPr/>
+                </a:tc>
+                <a:extLst>
+                  <a:ext uri="{0D108BD9-81ED-4DB2-BD59-A6C34878D82A}">
+                    <a16:rowId xmlns:a16="http://schemas.microsoft.com/office/drawing/2014/main" val="923472587"/>
+                  </a:ext>
+                </a:extLst>
+              </a:tr>
+              <a:tr h="370840">
+                <a:tc>
+                  <a:txBody>
+                    <a:bodyPr/>
+                    <a:lstStyle/>
+                    <a:p>
+                      <a:pPr algn="ctr"/>
+                      <a:r>
+                        <a:rPr lang="en-US" dirty="0"/>
+                        <a:t>SCK</a:t>
+                      </a:r>
+                    </a:p>
+                  </a:txBody>
+                  <a:tcPr/>
+                </a:tc>
+                <a:tc>
+                  <a:txBody>
+                    <a:bodyPr/>
+                    <a:lstStyle/>
+                    <a:p>
+                      <a:pPr algn="ctr"/>
+                      <a:r>
+                        <a:rPr lang="en-US" dirty="0">
+                          <a:sym typeface="Wingdings" pitchFamily="2" charset="2"/>
+                        </a:rPr>
+                        <a:t></a:t>
+                      </a:r>
+                      <a:endParaRPr lang="en-US" dirty="0"/>
+                    </a:p>
+                  </a:txBody>
+                  <a:tcPr/>
+                </a:tc>
+                <a:tc>
+                  <a:txBody>
+                    <a:bodyPr/>
+                    <a:lstStyle/>
+                    <a:p>
+                      <a:pPr algn="ctr"/>
+                      <a:r>
+                        <a:rPr lang="en-US" dirty="0"/>
+                        <a:t>PA05</a:t>
+                      </a:r>
+                    </a:p>
+                  </a:txBody>
+                  <a:tcPr/>
+                </a:tc>
+                <a:tc>
+                  <a:txBody>
+                    <a:bodyPr/>
+                    <a:lstStyle/>
+                    <a:p>
+                      <a:pPr algn="ctr"/>
+                      <a:r>
+                        <a:rPr lang="en-US" dirty="0"/>
+                        <a:t>J20-4</a:t>
+                      </a:r>
+                    </a:p>
+                  </a:txBody>
+                  <a:tcPr/>
+                </a:tc>
+                <a:extLst>
+                  <a:ext uri="{0D108BD9-81ED-4DB2-BD59-A6C34878D82A}">
+                    <a16:rowId xmlns:a16="http://schemas.microsoft.com/office/drawing/2014/main" val="1335566704"/>
+                  </a:ext>
+                </a:extLst>
+              </a:tr>
+              <a:tr h="370840">
+                <a:tc>
+                  <a:txBody>
+                    <a:bodyPr/>
+                    <a:lstStyle/>
+                    <a:p>
+                      <a:pPr algn="ctr"/>
+                      <a:r>
+                        <a:rPr lang="en-US" dirty="0"/>
+                        <a:t>CS</a:t>
+                      </a:r>
+                    </a:p>
+                  </a:txBody>
+                  <a:tcPr/>
+                </a:tc>
+                <a:tc>
+                  <a:txBody>
+                    <a:bodyPr/>
+                    <a:lstStyle/>
+                    <a:p>
+                      <a:pPr algn="ctr"/>
+                      <a:r>
+                        <a:rPr lang="en-US" dirty="0">
+                          <a:sym typeface="Wingdings" pitchFamily="2" charset="2"/>
+                        </a:rPr>
+                        <a:t></a:t>
+                      </a:r>
+                      <a:endParaRPr lang="en-US" dirty="0"/>
+                    </a:p>
+                  </a:txBody>
+                  <a:tcPr/>
+                </a:tc>
+                <a:tc>
+                  <a:txBody>
+                    <a:bodyPr/>
+                    <a:lstStyle/>
+                    <a:p>
+                      <a:pPr algn="ctr"/>
+                      <a:r>
+                        <a:rPr lang="en-US" dirty="0"/>
+                        <a:t>PA06</a:t>
+                      </a:r>
+                    </a:p>
+                  </a:txBody>
+                  <a:tcPr/>
+                </a:tc>
+                <a:tc>
+                  <a:txBody>
+                    <a:bodyPr/>
+                    <a:lstStyle/>
+                    <a:p>
+                      <a:pPr algn="ctr"/>
+                      <a:r>
+                        <a:rPr lang="en-US" dirty="0"/>
+                        <a:t>J20-3</a:t>
+                      </a:r>
+                    </a:p>
+                  </a:txBody>
+                  <a:tcPr/>
+                </a:tc>
+                <a:extLst>
+                  <a:ext uri="{0D108BD9-81ED-4DB2-BD59-A6C34878D82A}">
+                    <a16:rowId xmlns:a16="http://schemas.microsoft.com/office/drawing/2014/main" val="3247303121"/>
+                  </a:ext>
+                </a:extLst>
+              </a:tr>
+            </a:tbl>
+          </a:graphicData>
+        </a:graphic>
+      </p:graphicFrame>
+      <p:sp>
+        <p:nvSpPr>
+          <p:cNvPr id="18" name="Rectangle 17">
+            <a:extLst>
+              <a:ext uri="{FF2B5EF4-FFF2-40B4-BE49-F238E27FC236}">
+                <a16:creationId xmlns:a16="http://schemas.microsoft.com/office/drawing/2014/main" id="{3D1E9B33-B316-DC46-9B67-675901E56709}"/>
+              </a:ext>
+            </a:extLst>
+          </p:cNvPr>
+          <p:cNvSpPr/>
+          <p:nvPr/>
+        </p:nvSpPr>
+        <p:spPr>
+          <a:xfrm rot="16200000">
+            <a:off x="6216643" y="5542862"/>
+            <a:ext cx="1367758" cy="333774"/>
+          </a:xfrm>
+          <a:prstGeom prst="rect">
+            <a:avLst/>
+          </a:prstGeom>
+          <a:solidFill>
+            <a:srgbClr val="FF0000"/>
+          </a:solidFill>
+          <a:ln w="25400">
+            <a:solidFill>
+              <a:schemeClr val="tx1"/>
+            </a:solidFill>
+          </a:ln>
+          <a:effectLst/>
+        </p:spPr>
+        <p:style>
+          <a:lnRef idx="1">
+            <a:schemeClr val="accent1"/>
+          </a:lnRef>
+          <a:fillRef idx="3">
+            <a:schemeClr val="accent1"/>
+          </a:fillRef>
+          <a:effectRef idx="2">
+            <a:schemeClr val="accent1"/>
+          </a:effectRef>
+          <a:fontRef idx="minor">
+            <a:schemeClr val="lt1"/>
+          </a:fontRef>
+        </p:style>
+        <p:txBody>
+          <a:bodyPr rot="0" spcFirstLastPara="0" vertOverflow="overflow" horzOverflow="overflow" vert="horz" wrap="square" lIns="91440" tIns="45720" rIns="91440" bIns="45720" numCol="1" spcCol="0" rtlCol="0" fromWordArt="0" anchor="ctr" anchorCtr="0" forceAA="0" compatLnSpc="1">
+            <a:prstTxWarp prst="textNoShape">
+              <a:avLst/>
+            </a:prstTxWarp>
+            <a:noAutofit/>
+          </a:bodyPr>
+          <a:lstStyle/>
+          <a:p>
+            <a:pPr algn="ctr"/>
+            <a:r>
+              <a:rPr lang="en-US" dirty="0">
+                <a:solidFill>
+                  <a:srgbClr val="FFFF00"/>
+                </a:solidFill>
+              </a:rPr>
+              <a:t>SPI</a:t>
+            </a:r>
+          </a:p>
+        </p:txBody>
+      </p:sp>
+      <p:sp>
+        <p:nvSpPr>
+          <p:cNvPr id="19" name="Rectangle 18">
+            <a:extLst>
+              <a:ext uri="{FF2B5EF4-FFF2-40B4-BE49-F238E27FC236}">
+                <a16:creationId xmlns:a16="http://schemas.microsoft.com/office/drawing/2014/main" id="{E34CBC76-EB66-FA4D-ADEB-928BB6935F54}"/>
+              </a:ext>
+            </a:extLst>
+          </p:cNvPr>
+          <p:cNvSpPr/>
+          <p:nvPr/>
+        </p:nvSpPr>
+        <p:spPr>
+          <a:xfrm rot="16200000">
+            <a:off x="6425119" y="4383580"/>
+            <a:ext cx="950806" cy="333774"/>
+          </a:xfrm>
+          <a:prstGeom prst="rect">
+            <a:avLst/>
+          </a:prstGeom>
+          <a:solidFill>
+            <a:srgbClr val="FF0000"/>
+          </a:solidFill>
+          <a:ln w="25400">
+            <a:solidFill>
+              <a:schemeClr val="accent1"/>
+            </a:solidFill>
+          </a:ln>
+          <a:effectLst/>
+        </p:spPr>
+        <p:style>
+          <a:lnRef idx="1">
+            <a:schemeClr val="accent1"/>
+          </a:lnRef>
+          <a:fillRef idx="3">
+            <a:schemeClr val="accent1"/>
+          </a:fillRef>
+          <a:effectRef idx="2">
+            <a:schemeClr val="accent1"/>
+          </a:effectRef>
+          <a:fontRef idx="minor">
+            <a:schemeClr val="lt1"/>
+          </a:fontRef>
+        </p:style>
+        <p:txBody>
+          <a:bodyPr rot="0" spcFirstLastPara="0" vertOverflow="overflow" horzOverflow="overflow" vert="horz" wrap="square" lIns="91440" tIns="45720" rIns="91440" bIns="45720" numCol="1" spcCol="0" rtlCol="0" fromWordArt="0" anchor="ctr" anchorCtr="0" forceAA="0" compatLnSpc="1">
+            <a:prstTxWarp prst="textNoShape">
+              <a:avLst/>
+            </a:prstTxWarp>
+            <a:noAutofit/>
+          </a:bodyPr>
+          <a:lstStyle/>
+          <a:p>
+            <a:pPr algn="ctr"/>
+            <a:r>
+              <a:rPr lang="en-US" dirty="0">
+                <a:solidFill>
+                  <a:srgbClr val="FFFF00"/>
+                </a:solidFill>
+              </a:rPr>
+              <a:t>UART</a:t>
+            </a:r>
+          </a:p>
+        </p:txBody>
+      </p:sp>
+      <p:sp>
+        <p:nvSpPr>
+          <p:cNvPr id="13" name="Left-Right Arrow 12">
+            <a:extLst>
+              <a:ext uri="{FF2B5EF4-FFF2-40B4-BE49-F238E27FC236}">
+                <a16:creationId xmlns:a16="http://schemas.microsoft.com/office/drawing/2014/main" id="{CF845E19-DA75-D044-B1AE-0C0167115640}"/>
+              </a:ext>
+            </a:extLst>
+          </p:cNvPr>
+          <p:cNvSpPr/>
+          <p:nvPr/>
+        </p:nvSpPr>
+        <p:spPr>
+          <a:xfrm>
+            <a:off x="8128695" y="1980989"/>
+            <a:ext cx="1634362" cy="902958"/>
+          </a:xfrm>
+          <a:prstGeom prst="leftRightArrow">
+            <a:avLst/>
+          </a:prstGeom>
+          <a:solidFill>
+            <a:srgbClr val="FFC000"/>
+          </a:solidFill>
+          <a:ln>
+            <a:noFill/>
+          </a:ln>
+          <a:effectLst/>
+        </p:spPr>
+        <p:style>
+          <a:lnRef idx="1">
+            <a:schemeClr val="accent1"/>
+          </a:lnRef>
+          <a:fillRef idx="3">
+            <a:schemeClr val="accent1"/>
+          </a:fillRef>
+          <a:effectRef idx="2">
+            <a:schemeClr val="accent1"/>
+          </a:effectRef>
+          <a:fontRef idx="minor">
+            <a:schemeClr val="lt1"/>
+          </a:fontRef>
+        </p:style>
+        <p:txBody>
+          <a:bodyPr rot="0" spcFirstLastPara="0" vertOverflow="overflow" horzOverflow="overflow" vert="horz" wrap="square" lIns="91440" tIns="45720" rIns="91440" bIns="45720" numCol="1" spcCol="0" rtlCol="0" fromWordArt="0" anchor="ctr" anchorCtr="0" forceAA="0" compatLnSpc="1">
+            <a:prstTxWarp prst="textNoShape">
+              <a:avLst/>
+            </a:prstTxWarp>
+            <a:noAutofit/>
+          </a:bodyPr>
+          <a:lstStyle/>
+          <a:p>
+            <a:pPr algn="ctr"/>
+            <a:r>
+              <a:rPr lang="en-US" dirty="0">
+                <a:solidFill>
+                  <a:schemeClr val="tx1"/>
+                </a:solidFill>
+              </a:rPr>
+              <a:t>MQTT</a:t>
+            </a:r>
+          </a:p>
+        </p:txBody>
+      </p:sp>
+    </p:spTree>
+    <p:extLst>
+      <p:ext uri="{BB962C8B-B14F-4D97-AF65-F5344CB8AC3E}">
+        <p14:creationId xmlns:p14="http://schemas.microsoft.com/office/powerpoint/2010/main" val="1710071360"/>
+      </p:ext>
+    </p:extLst>
+  </p:cSld>
+  <p:clrMapOvr>
+    <a:masterClrMapping/>
+  </p:clrMapOvr>
+</p:sld>
+</file>
+
+<file path=ppt/slides/slide24.xml><?xml version="1.0" encoding="utf-8"?>
+<p:sld xmlns:a="http://schemas.openxmlformats.org/drawingml/2006/main" xmlns:r="http://schemas.openxmlformats.org/officeDocument/2006/relationships" xmlns:p="http://schemas.openxmlformats.org/presentationml/2006/main">
+  <p:cSld>
+    <p:spTree>
+      <p:nvGrpSpPr>
+        <p:cNvPr id="1" name=""/>
+        <p:cNvGrpSpPr/>
+        <p:nvPr/>
+      </p:nvGrpSpPr>
+      <p:grpSpPr>
+        <a:xfrm>
+          <a:off x="0" y="0"/>
+          <a:ext cx="0" cy="0"/>
+          <a:chOff x="0" y="0"/>
+          <a:chExt cx="0" cy="0"/>
+        </a:xfrm>
+      </p:grpSpPr>
+      <p:sp>
+        <p:nvSpPr>
+          <p:cNvPr id="2" name="Title 1">
+            <a:extLst>
+              <a:ext uri="{FF2B5EF4-FFF2-40B4-BE49-F238E27FC236}">
+                <a16:creationId xmlns:a16="http://schemas.microsoft.com/office/drawing/2014/main" id="{EBC90E80-F8C7-234E-BF60-75FE26D5BC74}"/>
+              </a:ext>
+            </a:extLst>
+          </p:cNvPr>
+          <p:cNvSpPr>
+            <a:spLocks noGrp="1"/>
+          </p:cNvSpPr>
+          <p:nvPr>
+            <p:ph type="title"/>
+          </p:nvPr>
+        </p:nvSpPr>
+        <p:spPr>
+          <a:xfrm>
+            <a:off x="355509" y="96296"/>
+            <a:ext cx="11400661" cy="777240"/>
+          </a:xfrm>
+        </p:spPr>
+        <p:txBody>
+          <a:bodyPr anchor="t">
+            <a:normAutofit/>
+          </a:bodyPr>
+          <a:lstStyle/>
+          <a:p>
+            <a:pPr>
+              <a:lnSpc>
+                <a:spcPct val="90000"/>
+              </a:lnSpc>
+            </a:pPr>
+            <a:r>
+              <a:rPr lang="en-US" dirty="0"/>
+              <a:t>Azure IoT Central Application – Dashboard View</a:t>
+            </a:r>
+          </a:p>
+        </p:txBody>
+      </p:sp>
+      <p:pic>
+        <p:nvPicPr>
+          <p:cNvPr id="5" name="Picture 4" descr="Graphical user interface, table&#10;&#10;Description automatically generated">
+            <a:extLst>
+              <a:ext uri="{FF2B5EF4-FFF2-40B4-BE49-F238E27FC236}">
+                <a16:creationId xmlns:a16="http://schemas.microsoft.com/office/drawing/2014/main" id="{9F3BC8DA-A3B2-004F-9B23-DF9355F56DD6}"/>
+              </a:ext>
+            </a:extLst>
+          </p:cNvPr>
+          <p:cNvPicPr>
+            <a:picLocks noChangeAspect="1"/>
+          </p:cNvPicPr>
+          <p:nvPr/>
+        </p:nvPicPr>
+        <p:blipFill>
+          <a:blip r:embed="rId2"/>
+          <a:stretch>
+            <a:fillRect/>
+          </a:stretch>
+        </p:blipFill>
+        <p:spPr>
+          <a:xfrm>
+            <a:off x="354778" y="1008154"/>
+            <a:ext cx="11400660" cy="5215800"/>
+          </a:xfrm>
+          <a:prstGeom prst="rect">
+            <a:avLst/>
+          </a:prstGeom>
+          <a:noFill/>
+        </p:spPr>
+      </p:pic>
+    </p:spTree>
+    <p:extLst>
+      <p:ext uri="{BB962C8B-B14F-4D97-AF65-F5344CB8AC3E}">
+        <p14:creationId xmlns:p14="http://schemas.microsoft.com/office/powerpoint/2010/main" val="370542450"/>
+      </p:ext>
+    </p:extLst>
+  </p:cSld>
+  <p:clrMapOvr>
+    <a:masterClrMapping/>
+  </p:clrMapOvr>
 </p:sld>
 </file>
 
@@ -33407,11 +34625,48 @@
 
 <file path=customXml/item2.xml><?xml version="1.0" encoding="utf-8"?>
 <?mso-contentType ?>
-<FormTemplates xmlns="http://schemas.microsoft.com/sharepoint/v3/contenttype/forms">
-  <Display>DocumentLibraryForm</Display>
-  <Edit>DocumentLibraryForm</Edit>
-  <New>DocumentLibraryForm</New>
-</FormTemplates>
+<spe:Receivers xmlns:spe="http://schemas.microsoft.com/sharepoint/events">
+  <Receiver>
+    <Name>Document ID Generator</Name>
+    <Synchronization>Synchronous</Synchronization>
+    <Type>10001</Type>
+    <SequenceNumber>1000</SequenceNumber>
+    <Assembly>Microsoft.Office.DocumentManagement, Version=14.0.0.0, Culture=neutral, PublicKeyToken=71e9bce111e9429c</Assembly>
+    <Class>Microsoft.Office.DocumentManagement.Internal.DocIdHandler</Class>
+    <Data/>
+    <Filter/>
+  </Receiver>
+  <Receiver>
+    <Name>Document ID Generator</Name>
+    <Synchronization>Synchronous</Synchronization>
+    <Type>10002</Type>
+    <SequenceNumber>1001</SequenceNumber>
+    <Assembly>Microsoft.Office.DocumentManagement, Version=14.0.0.0, Culture=neutral, PublicKeyToken=71e9bce111e9429c</Assembly>
+    <Class>Microsoft.Office.DocumentManagement.Internal.DocIdHandler</Class>
+    <Data/>
+    <Filter/>
+  </Receiver>
+  <Receiver>
+    <Name>Document ID Generator</Name>
+    <Synchronization>Synchronous</Synchronization>
+    <Type>10004</Type>
+    <SequenceNumber>1002</SequenceNumber>
+    <Assembly>Microsoft.Office.DocumentManagement, Version=14.0.0.0, Culture=neutral, PublicKeyToken=71e9bce111e9429c</Assembly>
+    <Class>Microsoft.Office.DocumentManagement.Internal.DocIdHandler</Class>
+    <Data/>
+    <Filter/>
+  </Receiver>
+  <Receiver>
+    <Name>Document ID Generator</Name>
+    <Synchronization>Synchronous</Synchronization>
+    <Type>10006</Type>
+    <SequenceNumber>1003</SequenceNumber>
+    <Assembly>Microsoft.Office.DocumentManagement, Version=14.0.0.0, Culture=neutral, PublicKeyToken=71e9bce111e9429c</Assembly>
+    <Class>Microsoft.Office.DocumentManagement.Internal.DocIdHandler</Class>
+    <Data/>
+    <Filter/>
+  </Receiver>
+</spe:Receivers>
 </file>
 
 <file path=customXml/item3.xml><?xml version="1.0" encoding="utf-8"?>
@@ -33572,48 +34827,11 @@
 
 <file path=customXml/item4.xml><?xml version="1.0" encoding="utf-8"?>
 <?mso-contentType ?>
-<spe:Receivers xmlns:spe="http://schemas.microsoft.com/sharepoint/events">
-  <Receiver>
-    <Name>Document ID Generator</Name>
-    <Synchronization>Synchronous</Synchronization>
-    <Type>10001</Type>
-    <SequenceNumber>1000</SequenceNumber>
-    <Assembly>Microsoft.Office.DocumentManagement, Version=14.0.0.0, Culture=neutral, PublicKeyToken=71e9bce111e9429c</Assembly>
-    <Class>Microsoft.Office.DocumentManagement.Internal.DocIdHandler</Class>
-    <Data/>
-    <Filter/>
-  </Receiver>
-  <Receiver>
-    <Name>Document ID Generator</Name>
-    <Synchronization>Synchronous</Synchronization>
-    <Type>10002</Type>
-    <SequenceNumber>1001</SequenceNumber>
-    <Assembly>Microsoft.Office.DocumentManagement, Version=14.0.0.0, Culture=neutral, PublicKeyToken=71e9bce111e9429c</Assembly>
-    <Class>Microsoft.Office.DocumentManagement.Internal.DocIdHandler</Class>
-    <Data/>
-    <Filter/>
-  </Receiver>
-  <Receiver>
-    <Name>Document ID Generator</Name>
-    <Synchronization>Synchronous</Synchronization>
-    <Type>10004</Type>
-    <SequenceNumber>1002</SequenceNumber>
-    <Assembly>Microsoft.Office.DocumentManagement, Version=14.0.0.0, Culture=neutral, PublicKeyToken=71e9bce111e9429c</Assembly>
-    <Class>Microsoft.Office.DocumentManagement.Internal.DocIdHandler</Class>
-    <Data/>
-    <Filter/>
-  </Receiver>
-  <Receiver>
-    <Name>Document ID Generator</Name>
-    <Synchronization>Synchronous</Synchronization>
-    <Type>10006</Type>
-    <SequenceNumber>1003</SequenceNumber>
-    <Assembly>Microsoft.Office.DocumentManagement, Version=14.0.0.0, Culture=neutral, PublicKeyToken=71e9bce111e9429c</Assembly>
-    <Class>Microsoft.Office.DocumentManagement.Internal.DocIdHandler</Class>
-    <Data/>
-    <Filter/>
-  </Receiver>
-</spe:Receivers>
+<FormTemplates xmlns="http://schemas.microsoft.com/sharepoint/v3/contenttype/forms">
+  <Display>DocumentLibraryForm</Display>
+  <Edit>DocumentLibraryForm</Edit>
+  <New>DocumentLibraryForm</New>
+</FormTemplates>
 </file>
 
 <file path=customXml/itemProps1.xml><?xml version="1.0" encoding="utf-8"?>
@@ -33628,9 +34846,9 @@
 </file>
 
 <file path=customXml/itemProps2.xml><?xml version="1.0" encoding="utf-8"?>
-<ds:datastoreItem xmlns:ds="http://schemas.openxmlformats.org/officeDocument/2006/customXml" ds:itemID="{0CE24DD7-9317-4AD8-82D4-5A6998DA79C7}">
+<ds:datastoreItem xmlns:ds="http://schemas.openxmlformats.org/officeDocument/2006/customXml" ds:itemID="{36ECED7C-7E24-4B80-B6AD-5BF0A508FB7B}">
   <ds:schemaRefs>
-    <ds:schemaRef ds:uri="http://schemas.microsoft.com/sharepoint/v3/contenttype/forms"/>
+    <ds:schemaRef ds:uri="http://schemas.microsoft.com/sharepoint/events"/>
   </ds:schemaRefs>
 </ds:datastoreItem>
 </file>
@@ -33655,9 +34873,9 @@
 </file>
 
 <file path=customXml/itemProps4.xml><?xml version="1.0" encoding="utf-8"?>
-<ds:datastoreItem xmlns:ds="http://schemas.openxmlformats.org/officeDocument/2006/customXml" ds:itemID="{36ECED7C-7E24-4B80-B6AD-5BF0A508FB7B}">
+<ds:datastoreItem xmlns:ds="http://schemas.openxmlformats.org/officeDocument/2006/customXml" ds:itemID="{0CE24DD7-9317-4AD8-82D4-5A6998DA79C7}">
   <ds:schemaRefs>
-    <ds:schemaRef ds:uri="http://schemas.microsoft.com/sharepoint/events"/>
+    <ds:schemaRef ds:uri="http://schemas.microsoft.com/sharepoint/v3/contenttype/forms"/>
   </ds:schemaRefs>
 </ds:datastoreItem>
 </file>
</xml_diff>